<commit_message>
Unidad 4, pptx y ejercicios
</commit_message>
<xml_diff>
--- a/Taller de Innovaciones Tecnológica/Unidad 4/6 - CSS parte 3.pptx
+++ b/Taller de Innovaciones Tecnológica/Unidad 4/6 - CSS parte 3.pptx
@@ -89,13 +89,13 @@
         </a:solidFill>
         <a:effectLst/>
         <a:uFillTx/>
-        <a:latin typeface="Graphik"/>
-        <a:ea typeface="Graphik"/>
-        <a:cs typeface="Graphik"/>
-        <a:sym typeface="Graphik"/>
+        <a:latin typeface="Graphik Semibold"/>
+        <a:ea typeface="Graphik Semibold"/>
+        <a:cs typeface="Graphik Semibold"/>
+        <a:sym typeface="Graphik Semibold"/>
       </a:defRPr>
     </a:lvl1pPr>
-    <a:lvl2pPr marL="0" marR="0" indent="457200" algn="l" defTabSz="2438400" rtl="0" fontAlgn="auto" latinLnBrk="0" hangingPunct="0">
+    <a:lvl2pPr marL="0" marR="0" indent="0" algn="l" defTabSz="2438400" rtl="0" fontAlgn="auto" latinLnBrk="0" hangingPunct="0">
       <a:lnSpc>
         <a:spcPct val="100000"/>
       </a:lnSpc>
@@ -119,13 +119,13 @@
         </a:solidFill>
         <a:effectLst/>
         <a:uFillTx/>
-        <a:latin typeface="Graphik"/>
-        <a:ea typeface="Graphik"/>
-        <a:cs typeface="Graphik"/>
-        <a:sym typeface="Graphik"/>
+        <a:latin typeface="Graphik Semibold"/>
+        <a:ea typeface="Graphik Semibold"/>
+        <a:cs typeface="Graphik Semibold"/>
+        <a:sym typeface="Graphik Semibold"/>
       </a:defRPr>
     </a:lvl2pPr>
-    <a:lvl3pPr marL="0" marR="0" indent="914400" algn="l" defTabSz="2438400" rtl="0" fontAlgn="auto" latinLnBrk="0" hangingPunct="0">
+    <a:lvl3pPr marL="0" marR="0" indent="0" algn="l" defTabSz="2438400" rtl="0" fontAlgn="auto" latinLnBrk="0" hangingPunct="0">
       <a:lnSpc>
         <a:spcPct val="100000"/>
       </a:lnSpc>
@@ -149,13 +149,13 @@
         </a:solidFill>
         <a:effectLst/>
         <a:uFillTx/>
-        <a:latin typeface="Graphik"/>
-        <a:ea typeface="Graphik"/>
-        <a:cs typeface="Graphik"/>
-        <a:sym typeface="Graphik"/>
+        <a:latin typeface="Graphik Semibold"/>
+        <a:ea typeface="Graphik Semibold"/>
+        <a:cs typeface="Graphik Semibold"/>
+        <a:sym typeface="Graphik Semibold"/>
       </a:defRPr>
     </a:lvl3pPr>
-    <a:lvl4pPr marL="0" marR="0" indent="1371600" algn="l" defTabSz="2438400" rtl="0" fontAlgn="auto" latinLnBrk="0" hangingPunct="0">
+    <a:lvl4pPr marL="0" marR="0" indent="0" algn="l" defTabSz="2438400" rtl="0" fontAlgn="auto" latinLnBrk="0" hangingPunct="0">
       <a:lnSpc>
         <a:spcPct val="100000"/>
       </a:lnSpc>
@@ -179,13 +179,13 @@
         </a:solidFill>
         <a:effectLst/>
         <a:uFillTx/>
-        <a:latin typeface="Graphik"/>
-        <a:ea typeface="Graphik"/>
-        <a:cs typeface="Graphik"/>
-        <a:sym typeface="Graphik"/>
+        <a:latin typeface="Graphik Semibold"/>
+        <a:ea typeface="Graphik Semibold"/>
+        <a:cs typeface="Graphik Semibold"/>
+        <a:sym typeface="Graphik Semibold"/>
       </a:defRPr>
     </a:lvl4pPr>
-    <a:lvl5pPr marL="0" marR="0" indent="1828800" algn="l" defTabSz="2438400" rtl="0" fontAlgn="auto" latinLnBrk="0" hangingPunct="0">
+    <a:lvl5pPr marL="0" marR="0" indent="0" algn="l" defTabSz="2438400" rtl="0" fontAlgn="auto" latinLnBrk="0" hangingPunct="0">
       <a:lnSpc>
         <a:spcPct val="100000"/>
       </a:lnSpc>
@@ -209,13 +209,13 @@
         </a:solidFill>
         <a:effectLst/>
         <a:uFillTx/>
-        <a:latin typeface="Graphik"/>
-        <a:ea typeface="Graphik"/>
-        <a:cs typeface="Graphik"/>
-        <a:sym typeface="Graphik"/>
+        <a:latin typeface="Graphik Semibold"/>
+        <a:ea typeface="Graphik Semibold"/>
+        <a:cs typeface="Graphik Semibold"/>
+        <a:sym typeface="Graphik Semibold"/>
       </a:defRPr>
     </a:lvl5pPr>
-    <a:lvl6pPr marL="0" marR="0" indent="2286000" algn="l" defTabSz="2438400" rtl="0" fontAlgn="auto" latinLnBrk="0" hangingPunct="0">
+    <a:lvl6pPr marL="0" marR="0" indent="0" algn="l" defTabSz="2438400" rtl="0" fontAlgn="auto" latinLnBrk="0" hangingPunct="0">
       <a:lnSpc>
         <a:spcPct val="100000"/>
       </a:lnSpc>
@@ -239,13 +239,13 @@
         </a:solidFill>
         <a:effectLst/>
         <a:uFillTx/>
-        <a:latin typeface="Graphik"/>
-        <a:ea typeface="Graphik"/>
-        <a:cs typeface="Graphik"/>
-        <a:sym typeface="Graphik"/>
+        <a:latin typeface="Graphik Semibold"/>
+        <a:ea typeface="Graphik Semibold"/>
+        <a:cs typeface="Graphik Semibold"/>
+        <a:sym typeface="Graphik Semibold"/>
       </a:defRPr>
     </a:lvl6pPr>
-    <a:lvl7pPr marL="0" marR="0" indent="2743200" algn="l" defTabSz="2438400" rtl="0" fontAlgn="auto" latinLnBrk="0" hangingPunct="0">
+    <a:lvl7pPr marL="0" marR="0" indent="0" algn="l" defTabSz="2438400" rtl="0" fontAlgn="auto" latinLnBrk="0" hangingPunct="0">
       <a:lnSpc>
         <a:spcPct val="100000"/>
       </a:lnSpc>
@@ -269,13 +269,13 @@
         </a:solidFill>
         <a:effectLst/>
         <a:uFillTx/>
-        <a:latin typeface="Graphik"/>
-        <a:ea typeface="Graphik"/>
-        <a:cs typeface="Graphik"/>
-        <a:sym typeface="Graphik"/>
+        <a:latin typeface="Graphik Semibold"/>
+        <a:ea typeface="Graphik Semibold"/>
+        <a:cs typeface="Graphik Semibold"/>
+        <a:sym typeface="Graphik Semibold"/>
       </a:defRPr>
     </a:lvl7pPr>
-    <a:lvl8pPr marL="0" marR="0" indent="3200400" algn="l" defTabSz="2438400" rtl="0" fontAlgn="auto" latinLnBrk="0" hangingPunct="0">
+    <a:lvl8pPr marL="0" marR="0" indent="0" algn="l" defTabSz="2438400" rtl="0" fontAlgn="auto" latinLnBrk="0" hangingPunct="0">
       <a:lnSpc>
         <a:spcPct val="100000"/>
       </a:lnSpc>
@@ -299,13 +299,13 @@
         </a:solidFill>
         <a:effectLst/>
         <a:uFillTx/>
-        <a:latin typeface="Graphik"/>
-        <a:ea typeface="Graphik"/>
-        <a:cs typeface="Graphik"/>
-        <a:sym typeface="Graphik"/>
+        <a:latin typeface="Graphik Semibold"/>
+        <a:ea typeface="Graphik Semibold"/>
+        <a:cs typeface="Graphik Semibold"/>
+        <a:sym typeface="Graphik Semibold"/>
       </a:defRPr>
     </a:lvl8pPr>
-    <a:lvl9pPr marL="0" marR="0" indent="3657600" algn="l" defTabSz="2438400" rtl="0" fontAlgn="auto" latinLnBrk="0" hangingPunct="0">
+    <a:lvl9pPr marL="0" marR="0" indent="0" algn="l" defTabSz="2438400" rtl="0" fontAlgn="auto" latinLnBrk="0" hangingPunct="0">
       <a:lnSpc>
         <a:spcPct val="100000"/>
       </a:lnSpc>
@@ -329,10 +329,10 @@
         </a:solidFill>
         <a:effectLst/>
         <a:uFillTx/>
-        <a:latin typeface="Graphik"/>
-        <a:ea typeface="Graphik"/>
-        <a:cs typeface="Graphik"/>
-        <a:sym typeface="Graphik"/>
+        <a:latin typeface="Graphik Semibold"/>
+        <a:ea typeface="Graphik Semibold"/>
+        <a:cs typeface="Graphik Semibold"/>
+        <a:sym typeface="Graphik Semibold"/>
       </a:defRPr>
     </a:lvl9pPr>
   </p:defaultTextStyle>
@@ -419,9 +419,9 @@
         <a:spcPct val="117999"/>
       </a:lnSpc>
       <a:defRPr sz="2200">
-        <a:latin typeface="Helvetica Neue"/>
-        <a:ea typeface="Helvetica Neue"/>
-        <a:cs typeface="Helvetica Neue"/>
+        <a:latin typeface="+mj-lt"/>
+        <a:ea typeface="+mj-ea"/>
+        <a:cs typeface="+mj-cs"/>
         <a:sym typeface="Helvetica Neue"/>
       </a:defRPr>
     </a:lvl1pPr>
@@ -430,9 +430,9 @@
         <a:spcPct val="117999"/>
       </a:lnSpc>
       <a:defRPr sz="2200">
-        <a:latin typeface="Helvetica Neue"/>
-        <a:ea typeface="Helvetica Neue"/>
-        <a:cs typeface="Helvetica Neue"/>
+        <a:latin typeface="+mj-lt"/>
+        <a:ea typeface="+mj-ea"/>
+        <a:cs typeface="+mj-cs"/>
         <a:sym typeface="Helvetica Neue"/>
       </a:defRPr>
     </a:lvl2pPr>
@@ -441,9 +441,9 @@
         <a:spcPct val="117999"/>
       </a:lnSpc>
       <a:defRPr sz="2200">
-        <a:latin typeface="Helvetica Neue"/>
-        <a:ea typeface="Helvetica Neue"/>
-        <a:cs typeface="Helvetica Neue"/>
+        <a:latin typeface="+mj-lt"/>
+        <a:ea typeface="+mj-ea"/>
+        <a:cs typeface="+mj-cs"/>
         <a:sym typeface="Helvetica Neue"/>
       </a:defRPr>
     </a:lvl3pPr>
@@ -452,9 +452,9 @@
         <a:spcPct val="117999"/>
       </a:lnSpc>
       <a:defRPr sz="2200">
-        <a:latin typeface="Helvetica Neue"/>
-        <a:ea typeface="Helvetica Neue"/>
-        <a:cs typeface="Helvetica Neue"/>
+        <a:latin typeface="+mj-lt"/>
+        <a:ea typeface="+mj-ea"/>
+        <a:cs typeface="+mj-cs"/>
         <a:sym typeface="Helvetica Neue"/>
       </a:defRPr>
     </a:lvl4pPr>
@@ -463,9 +463,9 @@
         <a:spcPct val="117999"/>
       </a:lnSpc>
       <a:defRPr sz="2200">
-        <a:latin typeface="Helvetica Neue"/>
-        <a:ea typeface="Helvetica Neue"/>
-        <a:cs typeface="Helvetica Neue"/>
+        <a:latin typeface="+mj-lt"/>
+        <a:ea typeface="+mj-ea"/>
+        <a:cs typeface="+mj-cs"/>
         <a:sym typeface="Helvetica Neue"/>
       </a:defRPr>
     </a:lvl5pPr>
@@ -474,9 +474,9 @@
         <a:spcPct val="117999"/>
       </a:lnSpc>
       <a:defRPr sz="2200">
-        <a:latin typeface="Helvetica Neue"/>
-        <a:ea typeface="Helvetica Neue"/>
-        <a:cs typeface="Helvetica Neue"/>
+        <a:latin typeface="+mj-lt"/>
+        <a:ea typeface="+mj-ea"/>
+        <a:cs typeface="+mj-cs"/>
         <a:sym typeface="Helvetica Neue"/>
       </a:defRPr>
     </a:lvl6pPr>
@@ -485,9 +485,9 @@
         <a:spcPct val="117999"/>
       </a:lnSpc>
       <a:defRPr sz="2200">
-        <a:latin typeface="Helvetica Neue"/>
-        <a:ea typeface="Helvetica Neue"/>
-        <a:cs typeface="Helvetica Neue"/>
+        <a:latin typeface="+mj-lt"/>
+        <a:ea typeface="+mj-ea"/>
+        <a:cs typeface="+mj-cs"/>
         <a:sym typeface="Helvetica Neue"/>
       </a:defRPr>
     </a:lvl7pPr>
@@ -496,9 +496,9 @@
         <a:spcPct val="117999"/>
       </a:lnSpc>
       <a:defRPr sz="2200">
-        <a:latin typeface="Helvetica Neue"/>
-        <a:ea typeface="Helvetica Neue"/>
-        <a:cs typeface="Helvetica Neue"/>
+        <a:latin typeface="+mj-lt"/>
+        <a:ea typeface="+mj-ea"/>
+        <a:cs typeface="+mj-cs"/>
         <a:sym typeface="Helvetica Neue"/>
       </a:defRPr>
     </a:lvl8pPr>
@@ -507,9 +507,9 @@
         <a:spcPct val="117999"/>
       </a:lnSpc>
       <a:defRPr sz="2200">
-        <a:latin typeface="Helvetica Neue"/>
-        <a:ea typeface="Helvetica Neue"/>
-        <a:cs typeface="Helvetica Neue"/>
+        <a:latin typeface="+mj-lt"/>
+        <a:ea typeface="+mj-ea"/>
+        <a:cs typeface="+mj-cs"/>
         <a:sym typeface="Helvetica Neue"/>
       </a:defRPr>
     </a:lvl9pPr>
@@ -518,7 +518,7 @@
 </file>
 
 <file path=ppt/slideLayouts/slideLayout1.xml><?xml version="1.0" encoding="utf-8"?>
-<p:sldLayout xmlns:a="http://schemas.openxmlformats.org/drawingml/2006/main" xmlns:r="http://schemas.openxmlformats.org/officeDocument/2006/relationships" xmlns:p="http://schemas.openxmlformats.org/presentationml/2006/main" xmlns:m="http://schemas.openxmlformats.org/officeDocument/2006/math" xmlns:a14="http://schemas.microsoft.com/office/drawing/2010/main" type="title" showMasterSp="1" showMasterPhAnim="1">
+<p:sldLayout xmlns:a="http://schemas.openxmlformats.org/drawingml/2006/main" xmlns:r="http://schemas.openxmlformats.org/officeDocument/2006/relationships" xmlns:p="http://schemas.openxmlformats.org/presentationml/2006/main" xmlns:m="http://schemas.openxmlformats.org/officeDocument/2006/math" xmlns:a14="http://schemas.microsoft.com/office/drawing/2010/main" type="tx" showMasterSp="1" showMasterPhAnim="1">
   <p:cSld name="Título">
     <p:spTree>
       <p:nvGrpSpPr>
@@ -554,7 +554,7 @@
         <p:txBody>
           <a:bodyPr/>
           <a:lstStyle>
-            <a:lvl1pPr defTabSz="2438338">
+            <a:lvl1pPr defTabSz="2438337">
               <a:lnSpc>
                 <a:spcPct val="90000"/>
               </a:lnSpc>
@@ -583,23 +583,23 @@
       </p:sp>
       <p:sp>
         <p:nvSpPr>
-          <p:cNvPr id="12" name="Autor y fecha"/>
+          <p:cNvPr id="12" name="Nivel de texto 1…"/>
           <p:cNvSpPr txBox="1"/>
           <p:nvPr>
-            <p:ph type="body" sz="quarter" idx="21" hasCustomPrompt="1"/>
+            <p:ph type="body" sz="quarter" idx="1" hasCustomPrompt="1"/>
           </p:nvPr>
         </p:nvSpPr>
         <p:spPr>
           <a:xfrm>
             <a:off x="1270000" y="12160429"/>
-            <a:ext cx="21844000" cy="694056"/>
-          </a:xfrm>
-          <a:prstGeom prst="rect">
-            <a:avLst/>
-          </a:prstGeom>
-        </p:spPr>
-        <p:txBody>
-          <a:bodyPr/>
+            <a:ext cx="21844000" cy="694057"/>
+          </a:xfrm>
+          <a:prstGeom prst="rect">
+            <a:avLst/>
+          </a:prstGeom>
+        </p:spPr>
+        <p:txBody>
+          <a:bodyPr numCol="1" spcCol="38100"/>
           <a:lstStyle>
             <a:lvl1pPr marL="0" indent="0" algn="ctr" defTabSz="825500">
               <a:spcBef>
@@ -615,6 +615,54 @@
                 <a:sym typeface="Graphik Medium"/>
               </a:defRPr>
             </a:lvl1pPr>
+            <a:lvl2pPr marL="966258" indent="-407458" algn="ctr" defTabSz="825500">
+              <a:spcBef>
+                <a:spcPts val="0"/>
+              </a:spcBef>
+              <a:buClrTx/>
+              <a:defRPr sz="3500">
+                <a:latin typeface="Graphik Medium"/>
+                <a:ea typeface="Graphik Medium"/>
+                <a:cs typeface="Graphik Medium"/>
+                <a:sym typeface="Graphik Medium"/>
+              </a:defRPr>
+            </a:lvl2pPr>
+            <a:lvl3pPr marL="1525058" indent="-407458" algn="ctr" defTabSz="825500">
+              <a:spcBef>
+                <a:spcPts val="0"/>
+              </a:spcBef>
+              <a:buClrTx/>
+              <a:defRPr sz="3500">
+                <a:latin typeface="Graphik Medium"/>
+                <a:ea typeface="Graphik Medium"/>
+                <a:cs typeface="Graphik Medium"/>
+                <a:sym typeface="Graphik Medium"/>
+              </a:defRPr>
+            </a:lvl3pPr>
+            <a:lvl4pPr marL="2083858" indent="-407458" algn="ctr" defTabSz="825500">
+              <a:spcBef>
+                <a:spcPts val="0"/>
+              </a:spcBef>
+              <a:buClrTx/>
+              <a:defRPr sz="3500">
+                <a:latin typeface="Graphik Medium"/>
+                <a:ea typeface="Graphik Medium"/>
+                <a:cs typeface="Graphik Medium"/>
+                <a:sym typeface="Graphik Medium"/>
+              </a:defRPr>
+            </a:lvl4pPr>
+            <a:lvl5pPr marL="2642658" indent="-407458" algn="ctr" defTabSz="825500">
+              <a:spcBef>
+                <a:spcPts val="0"/>
+              </a:spcBef>
+              <a:buClrTx/>
+              <a:defRPr sz="3500">
+                <a:latin typeface="Graphik Medium"/>
+                <a:ea typeface="Graphik Medium"/>
+                <a:cs typeface="Graphik Medium"/>
+                <a:sym typeface="Graphik Medium"/>
+              </a:defRPr>
+            </a:lvl5pPr>
           </a:lstStyle>
           <a:p>
             <a:pPr/>
@@ -622,6 +670,30 @@
               <a:t>Autor y fecha</a:t>
             </a:r>
           </a:p>
+          <a:p>
+            <a:pPr lvl="1"/>
+            <a:r>
+              <a:t/>
+            </a:r>
+          </a:p>
+          <a:p>
+            <a:pPr lvl="2"/>
+            <a:r>
+              <a:t/>
+            </a:r>
+          </a:p>
+          <a:p>
+            <a:pPr lvl="3"/>
+            <a:r>
+              <a:t/>
+            </a:r>
+          </a:p>
+          <a:p>
+            <a:pPr lvl="4"/>
+            <a:r>
+              <a:t/>
+            </a:r>
+          </a:p>
         </p:txBody>
       </p:sp>
       <p:sp>
@@ -629,20 +701,20 @@
           <p:cNvPr id="13" name="Nivel de texto 1…"/>
           <p:cNvSpPr txBox="1"/>
           <p:nvPr>
-            <p:ph type="body" sz="quarter" idx="1" hasCustomPrompt="1"/>
+            <p:ph type="body" sz="quarter" idx="21" hasCustomPrompt="1"/>
           </p:nvPr>
         </p:nvSpPr>
         <p:spPr>
           <a:xfrm>
-            <a:off x="1270000" y="6985000"/>
-            <a:ext cx="21844000" cy="2512352"/>
-          </a:xfrm>
-          <a:prstGeom prst="rect">
-            <a:avLst/>
-          </a:prstGeom>
-        </p:spPr>
-        <p:txBody>
-          <a:bodyPr/>
+            <a:off x="1270000" y="6984999"/>
+            <a:ext cx="21844000" cy="2512354"/>
+          </a:xfrm>
+          <a:prstGeom prst="rect">
+            <a:avLst/>
+          </a:prstGeom>
+        </p:spPr>
+        <p:txBody>
+          <a:bodyPr numCol="1" spcCol="38100"/>
           <a:lstStyle>
             <a:lvl1pPr marL="0" indent="0" algn="ctr" defTabSz="825500">
               <a:spcBef>
@@ -658,91 +730,11 @@
                 <a:sym typeface="Graphik Medium"/>
               </a:defRPr>
             </a:lvl1pPr>
-            <a:lvl2pPr marL="0" indent="0" algn="ctr" defTabSz="825500">
-              <a:spcBef>
-                <a:spcPts val="0"/>
-              </a:spcBef>
-              <a:buClrTx/>
-              <a:buSzTx/>
-              <a:buNone/>
-              <a:defRPr sz="6400">
-                <a:latin typeface="Graphik Medium"/>
-                <a:ea typeface="Graphik Medium"/>
-                <a:cs typeface="Graphik Medium"/>
-                <a:sym typeface="Graphik Medium"/>
-              </a:defRPr>
-            </a:lvl2pPr>
-            <a:lvl3pPr marL="0" indent="0" algn="ctr" defTabSz="825500">
-              <a:spcBef>
-                <a:spcPts val="0"/>
-              </a:spcBef>
-              <a:buClrTx/>
-              <a:buSzTx/>
-              <a:buNone/>
-              <a:defRPr sz="6400">
-                <a:latin typeface="Graphik Medium"/>
-                <a:ea typeface="Graphik Medium"/>
-                <a:cs typeface="Graphik Medium"/>
-                <a:sym typeface="Graphik Medium"/>
-              </a:defRPr>
-            </a:lvl3pPr>
-            <a:lvl4pPr marL="0" indent="0" algn="ctr" defTabSz="825500">
-              <a:spcBef>
-                <a:spcPts val="0"/>
-              </a:spcBef>
-              <a:buClrTx/>
-              <a:buSzTx/>
-              <a:buNone/>
-              <a:defRPr sz="6400">
-                <a:latin typeface="Graphik Medium"/>
-                <a:ea typeface="Graphik Medium"/>
-                <a:cs typeface="Graphik Medium"/>
-                <a:sym typeface="Graphik Medium"/>
-              </a:defRPr>
-            </a:lvl4pPr>
-            <a:lvl5pPr marL="0" indent="0" algn="ctr" defTabSz="825500">
-              <a:spcBef>
-                <a:spcPts val="0"/>
-              </a:spcBef>
-              <a:buClrTx/>
-              <a:buSzTx/>
-              <a:buNone/>
-              <a:defRPr sz="6400">
-                <a:latin typeface="Graphik Medium"/>
-                <a:ea typeface="Graphik Medium"/>
-                <a:cs typeface="Graphik Medium"/>
-                <a:sym typeface="Graphik Medium"/>
-              </a:defRPr>
-            </a:lvl5pPr>
           </a:lstStyle>
           <a:p>
             <a:pPr/>
             <a:r>
               <a:t>Subtítulo de presentación</a:t>
-            </a:r>
-          </a:p>
-          <a:p>
-            <a:pPr lvl="1"/>
-            <a:r>
-              <a:t/>
-            </a:r>
-          </a:p>
-          <a:p>
-            <a:pPr lvl="2"/>
-            <a:r>
-              <a:t/>
-            </a:r>
-          </a:p>
-          <a:p>
-            <a:pPr lvl="3"/>
-            <a:r>
-              <a:t/>
-            </a:r>
-          </a:p>
-          <a:p>
-            <a:pPr lvl="4"/>
-            <a:r>
-              <a:t/>
             </a:r>
           </a:p>
         </p:txBody>
@@ -804,6 +796,10 @@
           </p:nvPr>
         </p:nvSpPr>
         <p:spPr>
+          <a:xfrm>
+            <a:off x="1270000" y="812800"/>
+            <a:ext cx="21844000" cy="1557438"/>
+          </a:xfrm>
           <a:prstGeom prst="rect">
             <a:avLst/>
           </a:prstGeom>
@@ -821,10 +817,10 @@
       </p:sp>
       <p:sp>
         <p:nvSpPr>
-          <p:cNvPr id="100" name="Subtítulo de diapositiva"/>
+          <p:cNvPr id="100" name="Nivel de texto 1…"/>
           <p:cNvSpPr txBox="1"/>
           <p:nvPr>
-            <p:ph type="body" sz="quarter" idx="21" hasCustomPrompt="1"/>
+            <p:ph type="body" sz="quarter" idx="1" hasCustomPrompt="1"/>
           </p:nvPr>
         </p:nvSpPr>
         <p:spPr>
@@ -837,7 +833,7 @@
           </a:prstGeom>
         </p:spPr>
         <p:txBody>
-          <a:bodyPr/>
+          <a:bodyPr numCol="1" spcCol="38100"/>
           <a:lstStyle>
             <a:lvl1pPr marL="0" indent="0" algn="ctr" defTabSz="825500">
               <a:spcBef>
@@ -853,11 +849,83 @@
                 <a:sym typeface="Graphik Medium"/>
               </a:defRPr>
             </a:lvl1pPr>
+            <a:lvl2pPr marL="1187450" indent="-628650" algn="ctr" defTabSz="825500">
+              <a:spcBef>
+                <a:spcPts val="0"/>
+              </a:spcBef>
+              <a:buClrTx/>
+              <a:defRPr sz="5400">
+                <a:latin typeface="Graphik Medium"/>
+                <a:ea typeface="Graphik Medium"/>
+                <a:cs typeface="Graphik Medium"/>
+                <a:sym typeface="Graphik Medium"/>
+              </a:defRPr>
+            </a:lvl2pPr>
+            <a:lvl3pPr marL="1746250" indent="-628650" algn="ctr" defTabSz="825500">
+              <a:spcBef>
+                <a:spcPts val="0"/>
+              </a:spcBef>
+              <a:buClrTx/>
+              <a:defRPr sz="5400">
+                <a:latin typeface="Graphik Medium"/>
+                <a:ea typeface="Graphik Medium"/>
+                <a:cs typeface="Graphik Medium"/>
+                <a:sym typeface="Graphik Medium"/>
+              </a:defRPr>
+            </a:lvl3pPr>
+            <a:lvl4pPr marL="2305050" indent="-628650" algn="ctr" defTabSz="825500">
+              <a:spcBef>
+                <a:spcPts val="0"/>
+              </a:spcBef>
+              <a:buClrTx/>
+              <a:defRPr sz="5400">
+                <a:latin typeface="Graphik Medium"/>
+                <a:ea typeface="Graphik Medium"/>
+                <a:cs typeface="Graphik Medium"/>
+                <a:sym typeface="Graphik Medium"/>
+              </a:defRPr>
+            </a:lvl4pPr>
+            <a:lvl5pPr marL="2863850" indent="-628650" algn="ctr" defTabSz="825500">
+              <a:spcBef>
+                <a:spcPts val="0"/>
+              </a:spcBef>
+              <a:buClrTx/>
+              <a:defRPr sz="5400">
+                <a:latin typeface="Graphik Medium"/>
+                <a:ea typeface="Graphik Medium"/>
+                <a:cs typeface="Graphik Medium"/>
+                <a:sym typeface="Graphik Medium"/>
+              </a:defRPr>
+            </a:lvl5pPr>
           </a:lstStyle>
           <a:p>
             <a:pPr/>
             <a:r>
               <a:t>Subtítulo de diapositiva</a:t>
+            </a:r>
+          </a:p>
+          <a:p>
+            <a:pPr lvl="1"/>
+            <a:r>
+              <a:t/>
+            </a:r>
+          </a:p>
+          <a:p>
+            <a:pPr lvl="2"/>
+            <a:r>
+              <a:t/>
+            </a:r>
+          </a:p>
+          <a:p>
+            <a:pPr lvl="3"/>
+            <a:r>
+              <a:t/>
+            </a:r>
+          </a:p>
+          <a:p>
+            <a:pPr lvl="4"/>
+            <a:r>
+              <a:t/>
             </a:r>
           </a:p>
         </p:txBody>
@@ -940,10 +1008,10 @@
       </p:sp>
       <p:sp>
         <p:nvSpPr>
-          <p:cNvPr id="109" name="Subtítulo de agenda"/>
+          <p:cNvPr id="109" name="Nivel de texto 1…"/>
           <p:cNvSpPr txBox="1"/>
           <p:nvPr>
-            <p:ph type="body" sz="quarter" idx="21" hasCustomPrompt="1"/>
+            <p:ph type="body" sz="quarter" idx="1" hasCustomPrompt="1"/>
           </p:nvPr>
         </p:nvSpPr>
         <p:spPr>
@@ -956,7 +1024,7 @@
           </a:prstGeom>
         </p:spPr>
         <p:txBody>
-          <a:bodyPr/>
+          <a:bodyPr numCol="1" spcCol="38100"/>
           <a:lstStyle>
             <a:lvl1pPr marL="0" indent="0" algn="ctr" defTabSz="825500">
               <a:spcBef>
@@ -972,6 +1040,54 @@
                 <a:sym typeface="Graphik Medium"/>
               </a:defRPr>
             </a:lvl1pPr>
+            <a:lvl2pPr marL="1187450" indent="-628650" algn="ctr" defTabSz="825500">
+              <a:spcBef>
+                <a:spcPts val="0"/>
+              </a:spcBef>
+              <a:buClrTx/>
+              <a:defRPr sz="5400">
+                <a:latin typeface="Graphik Medium"/>
+                <a:ea typeface="Graphik Medium"/>
+                <a:cs typeface="Graphik Medium"/>
+                <a:sym typeface="Graphik Medium"/>
+              </a:defRPr>
+            </a:lvl2pPr>
+            <a:lvl3pPr marL="1746250" indent="-628650" algn="ctr" defTabSz="825500">
+              <a:spcBef>
+                <a:spcPts val="0"/>
+              </a:spcBef>
+              <a:buClrTx/>
+              <a:defRPr sz="5400">
+                <a:latin typeface="Graphik Medium"/>
+                <a:ea typeface="Graphik Medium"/>
+                <a:cs typeface="Graphik Medium"/>
+                <a:sym typeface="Graphik Medium"/>
+              </a:defRPr>
+            </a:lvl3pPr>
+            <a:lvl4pPr marL="2305050" indent="-628650" algn="ctr" defTabSz="825500">
+              <a:spcBef>
+                <a:spcPts val="0"/>
+              </a:spcBef>
+              <a:buClrTx/>
+              <a:defRPr sz="5400">
+                <a:latin typeface="Graphik Medium"/>
+                <a:ea typeface="Graphik Medium"/>
+                <a:cs typeface="Graphik Medium"/>
+                <a:sym typeface="Graphik Medium"/>
+              </a:defRPr>
+            </a:lvl4pPr>
+            <a:lvl5pPr marL="2863850" indent="-628650" algn="ctr" defTabSz="825500">
+              <a:spcBef>
+                <a:spcPts val="0"/>
+              </a:spcBef>
+              <a:buClrTx/>
+              <a:defRPr sz="5400">
+                <a:latin typeface="Graphik Medium"/>
+                <a:ea typeface="Graphik Medium"/>
+                <a:cs typeface="Graphik Medium"/>
+                <a:sym typeface="Graphik Medium"/>
+              </a:defRPr>
+            </a:lvl5pPr>
           </a:lstStyle>
           <a:p>
             <a:pPr/>
@@ -979,6 +1095,30 @@
               <a:t>Subtítulo de agenda</a:t>
             </a:r>
           </a:p>
+          <a:p>
+            <a:pPr lvl="1"/>
+            <a:r>
+              <a:t/>
+            </a:r>
+          </a:p>
+          <a:p>
+            <a:pPr lvl="2"/>
+            <a:r>
+              <a:t/>
+            </a:r>
+          </a:p>
+          <a:p>
+            <a:pPr lvl="3"/>
+            <a:r>
+              <a:t/>
+            </a:r>
+          </a:p>
+          <a:p>
+            <a:pPr lvl="4"/>
+            <a:r>
+              <a:t/>
+            </a:r>
+          </a:p>
         </p:txBody>
       </p:sp>
       <p:sp>
@@ -986,76 +1126,32 @@
           <p:cNvPr id="110" name="Nivel de texto 1…"/>
           <p:cNvSpPr txBox="1"/>
           <p:nvPr>
-            <p:ph type="body" idx="1" hasCustomPrompt="1"/>
+            <p:ph type="body" idx="21" hasCustomPrompt="1"/>
           </p:nvPr>
         </p:nvSpPr>
         <p:spPr>
-          <a:prstGeom prst="rect">
-            <a:avLst/>
-          </a:prstGeom>
-        </p:spPr>
-        <p:txBody>
-          <a:bodyPr/>
+          <a:xfrm>
+            <a:off x="1270000" y="4267200"/>
+            <a:ext cx="21844000" cy="8432800"/>
+          </a:xfrm>
+          <a:prstGeom prst="rect">
+            <a:avLst/>
+          </a:prstGeom>
+        </p:spPr>
+        <p:txBody>
+          <a:bodyPr numCol="1" spcCol="38100"/>
           <a:lstStyle>
             <a:lvl1pPr marL="0" indent="0" defTabSz="825500">
               <a:buClrTx/>
               <a:buSzTx/>
               <a:buNone/>
-              <a:defRPr spc="-55" sz="5500"/>
+              <a:defRPr spc="-99" sz="5500"/>
             </a:lvl1pPr>
-            <a:lvl2pPr marL="0" indent="457200" defTabSz="825500">
-              <a:buClrTx/>
-              <a:buSzTx/>
-              <a:buNone/>
-              <a:defRPr spc="-55" sz="5500"/>
-            </a:lvl2pPr>
-            <a:lvl3pPr marL="0" indent="914400" defTabSz="825500">
-              <a:buClrTx/>
-              <a:buSzTx/>
-              <a:buNone/>
-              <a:defRPr spc="-55" sz="5500"/>
-            </a:lvl3pPr>
-            <a:lvl4pPr marL="0" indent="1371600" defTabSz="825500">
-              <a:buClrTx/>
-              <a:buSzTx/>
-              <a:buNone/>
-              <a:defRPr spc="-55" sz="5500"/>
-            </a:lvl4pPr>
-            <a:lvl5pPr marL="0" indent="1828800" defTabSz="825500">
-              <a:buClrTx/>
-              <a:buSzTx/>
-              <a:buNone/>
-              <a:defRPr spc="-55" sz="5500"/>
-            </a:lvl5pPr>
           </a:lstStyle>
           <a:p>
             <a:pPr/>
             <a:r>
               <a:t>Temas de agenda</a:t>
-            </a:r>
-          </a:p>
-          <a:p>
-            <a:pPr lvl="1"/>
-            <a:r>
-              <a:t/>
-            </a:r>
-          </a:p>
-          <a:p>
-            <a:pPr lvl="2"/>
-            <a:r>
-              <a:t/>
-            </a:r>
-          </a:p>
-          <a:p>
-            <a:pPr lvl="3"/>
-            <a:r>
-              <a:t/>
-            </a:r>
-          </a:p>
-          <a:p>
-            <a:pPr lvl="4"/>
-            <a:r>
-              <a:t/>
             </a:r>
           </a:p>
         </p:txBody>
@@ -1119,14 +1215,14 @@
         <p:spPr>
           <a:xfrm>
             <a:off x="1270000" y="4927600"/>
-            <a:ext cx="21844000" cy="3902869"/>
-          </a:xfrm>
-          <a:prstGeom prst="rect">
-            <a:avLst/>
-          </a:prstGeom>
-        </p:spPr>
-        <p:txBody>
-          <a:bodyPr anchor="ctr"/>
+            <a:ext cx="21844000" cy="3902870"/>
+          </a:xfrm>
+          <a:prstGeom prst="rect">
+            <a:avLst/>
+          </a:prstGeom>
+        </p:spPr>
+        <p:txBody>
+          <a:bodyPr numCol="1" spcCol="38100" anchor="ctr"/>
           <a:lstStyle>
             <a:lvl1pPr marL="0" indent="0" algn="ctr">
               <a:spcBef>
@@ -1153,7 +1249,7 @@
                 <a:sym typeface="Graphik Medium"/>
               </a:defRPr>
             </a:lvl1pPr>
-            <a:lvl2pPr marL="0" indent="457200" algn="ctr">
+            <a:lvl2pPr marL="0" indent="0" algn="ctr">
               <a:spcBef>
                 <a:spcPts val="0"/>
               </a:spcBef>
@@ -1178,7 +1274,7 @@
                 <a:sym typeface="Graphik Medium"/>
               </a:defRPr>
             </a:lvl2pPr>
-            <a:lvl3pPr marL="0" indent="914400" algn="ctr">
+            <a:lvl3pPr marL="0" indent="0" algn="ctr">
               <a:spcBef>
                 <a:spcPts val="0"/>
               </a:spcBef>
@@ -1203,7 +1299,7 @@
                 <a:sym typeface="Graphik Medium"/>
               </a:defRPr>
             </a:lvl3pPr>
-            <a:lvl4pPr marL="0" indent="1371600" algn="ctr">
+            <a:lvl4pPr marL="0" indent="0" algn="ctr">
               <a:spcBef>
                 <a:spcPts val="0"/>
               </a:spcBef>
@@ -1228,7 +1324,7 @@
                 <a:sym typeface="Graphik Medium"/>
               </a:defRPr>
             </a:lvl4pPr>
-            <a:lvl5pPr marL="0" indent="1828800" algn="ctr">
+            <a:lvl5pPr marL="0" indent="0" algn="ctr">
               <a:spcBef>
                 <a:spcPts val="0"/>
               </a:spcBef>
@@ -1352,9 +1448,9 @@
           </a:prstGeom>
         </p:spPr>
         <p:txBody>
-          <a:bodyPr anchor="b"/>
+          <a:bodyPr numCol="1" spcCol="38100" anchor="b"/>
           <a:lstStyle>
-            <a:lvl1pPr marL="0" indent="0" algn="ctr" defTabSz="2438338">
+            <a:lvl1pPr marL="0" indent="0" algn="ctr" defTabSz="2438337">
               <a:lnSpc>
                 <a:spcPct val="80000"/>
               </a:lnSpc>
@@ -1376,13 +1472,13 @@
                   </a:gsLst>
                   <a:lin ang="3960000" scaled="0"/>
                 </a:gradFill>
-                <a:latin typeface="+mn-lt"/>
-                <a:ea typeface="+mn-ea"/>
-                <a:cs typeface="+mn-cs"/>
+                <a:latin typeface="Graphik Semibold"/>
+                <a:ea typeface="Graphik Semibold"/>
+                <a:cs typeface="Graphik Semibold"/>
                 <a:sym typeface="Graphik Semibold"/>
               </a:defRPr>
             </a:lvl1pPr>
-            <a:lvl2pPr marL="0" indent="457200" algn="ctr" defTabSz="2438338">
+            <a:lvl2pPr marL="0" indent="0" algn="ctr" defTabSz="2438337">
               <a:lnSpc>
                 <a:spcPct val="80000"/>
               </a:lnSpc>
@@ -1404,13 +1500,13 @@
                   </a:gsLst>
                   <a:lin ang="3960000" scaled="0"/>
                 </a:gradFill>
-                <a:latin typeface="+mn-lt"/>
-                <a:ea typeface="+mn-ea"/>
-                <a:cs typeface="+mn-cs"/>
+                <a:latin typeface="Graphik Semibold"/>
+                <a:ea typeface="Graphik Semibold"/>
+                <a:cs typeface="Graphik Semibold"/>
                 <a:sym typeface="Graphik Semibold"/>
               </a:defRPr>
             </a:lvl2pPr>
-            <a:lvl3pPr marL="0" indent="914400" algn="ctr" defTabSz="2438338">
+            <a:lvl3pPr marL="0" indent="0" algn="ctr" defTabSz="2438337">
               <a:lnSpc>
                 <a:spcPct val="80000"/>
               </a:lnSpc>
@@ -1432,13 +1528,13 @@
                   </a:gsLst>
                   <a:lin ang="3960000" scaled="0"/>
                 </a:gradFill>
-                <a:latin typeface="+mn-lt"/>
-                <a:ea typeface="+mn-ea"/>
-                <a:cs typeface="+mn-cs"/>
+                <a:latin typeface="Graphik Semibold"/>
+                <a:ea typeface="Graphik Semibold"/>
+                <a:cs typeface="Graphik Semibold"/>
                 <a:sym typeface="Graphik Semibold"/>
               </a:defRPr>
             </a:lvl3pPr>
-            <a:lvl4pPr marL="0" indent="1371600" algn="ctr" defTabSz="2438338">
+            <a:lvl4pPr marL="0" indent="0" algn="ctr" defTabSz="2438337">
               <a:lnSpc>
                 <a:spcPct val="80000"/>
               </a:lnSpc>
@@ -1460,13 +1556,13 @@
                   </a:gsLst>
                   <a:lin ang="3960000" scaled="0"/>
                 </a:gradFill>
-                <a:latin typeface="+mn-lt"/>
-                <a:ea typeface="+mn-ea"/>
-                <a:cs typeface="+mn-cs"/>
+                <a:latin typeface="Graphik Semibold"/>
+                <a:ea typeface="Graphik Semibold"/>
+                <a:cs typeface="Graphik Semibold"/>
                 <a:sym typeface="Graphik Semibold"/>
               </a:defRPr>
             </a:lvl4pPr>
-            <a:lvl5pPr marL="0" indent="1828800" algn="ctr" defTabSz="2438338">
+            <a:lvl5pPr marL="0" indent="0" algn="ctr" defTabSz="2438337">
               <a:lnSpc>
                 <a:spcPct val="80000"/>
               </a:lnSpc>
@@ -1488,9 +1584,9 @@
                   </a:gsLst>
                   <a:lin ang="3960000" scaled="0"/>
                 </a:gradFill>
-                <a:latin typeface="+mn-lt"/>
-                <a:ea typeface="+mn-ea"/>
-                <a:cs typeface="+mn-cs"/>
+                <a:latin typeface="Graphik Semibold"/>
+                <a:ea typeface="Graphik Semibold"/>
+                <a:cs typeface="Graphik Semibold"/>
                 <a:sym typeface="Graphik Semibold"/>
               </a:defRPr>
             </a:lvl5pPr>
@@ -1545,7 +1641,7 @@
           </a:prstGeom>
         </p:spPr>
         <p:txBody>
-          <a:bodyPr/>
+          <a:bodyPr numCol="1" spcCol="38100"/>
           <a:lstStyle>
             <a:lvl1pPr marL="0" indent="0" algn="ctr" defTabSz="825500">
               <a:spcBef>
@@ -1620,23 +1716,23 @@
       </p:grpSpPr>
       <p:sp>
         <p:nvSpPr>
-          <p:cNvPr id="135" name="Atribución"/>
+          <p:cNvPr id="135" name="Nivel de texto 1…"/>
           <p:cNvSpPr txBox="1"/>
           <p:nvPr>
-            <p:ph type="body" sz="quarter" idx="21" hasCustomPrompt="1"/>
+            <p:ph type="body" sz="quarter" idx="1" hasCustomPrompt="1"/>
           </p:nvPr>
         </p:nvSpPr>
         <p:spPr>
           <a:xfrm>
-            <a:off x="1270000" y="11155086"/>
-            <a:ext cx="21844000" cy="832613"/>
-          </a:xfrm>
-          <a:prstGeom prst="rect">
-            <a:avLst/>
-          </a:prstGeom>
-        </p:spPr>
-        <p:txBody>
-          <a:bodyPr anchor="ctr"/>
+            <a:off x="1270000" y="11155085"/>
+            <a:ext cx="21844000" cy="832614"/>
+          </a:xfrm>
+          <a:prstGeom prst="rect">
+            <a:avLst/>
+          </a:prstGeom>
+        </p:spPr>
+        <p:txBody>
+          <a:bodyPr numCol="1" spcCol="38100" anchor="ctr"/>
           <a:lstStyle>
             <a:lvl1pPr marL="0" indent="0" algn="ctr" defTabSz="825500">
               <a:spcBef>
@@ -1652,6 +1748,54 @@
                 <a:sym typeface="Graphik Medium"/>
               </a:defRPr>
             </a:lvl1pPr>
+            <a:lvl2pPr marL="1071033" indent="-512233" algn="ctr" defTabSz="825500">
+              <a:spcBef>
+                <a:spcPts val="0"/>
+              </a:spcBef>
+              <a:buClrTx/>
+              <a:defRPr sz="4400">
+                <a:latin typeface="Graphik Medium"/>
+                <a:ea typeface="Graphik Medium"/>
+                <a:cs typeface="Graphik Medium"/>
+                <a:sym typeface="Graphik Medium"/>
+              </a:defRPr>
+            </a:lvl2pPr>
+            <a:lvl3pPr marL="1629833" indent="-512233" algn="ctr" defTabSz="825500">
+              <a:spcBef>
+                <a:spcPts val="0"/>
+              </a:spcBef>
+              <a:buClrTx/>
+              <a:defRPr sz="4400">
+                <a:latin typeface="Graphik Medium"/>
+                <a:ea typeface="Graphik Medium"/>
+                <a:cs typeface="Graphik Medium"/>
+                <a:sym typeface="Graphik Medium"/>
+              </a:defRPr>
+            </a:lvl3pPr>
+            <a:lvl4pPr marL="2188633" indent="-512233" algn="ctr" defTabSz="825500">
+              <a:spcBef>
+                <a:spcPts val="0"/>
+              </a:spcBef>
+              <a:buClrTx/>
+              <a:defRPr sz="4400">
+                <a:latin typeface="Graphik Medium"/>
+                <a:ea typeface="Graphik Medium"/>
+                <a:cs typeface="Graphik Medium"/>
+                <a:sym typeface="Graphik Medium"/>
+              </a:defRPr>
+            </a:lvl4pPr>
+            <a:lvl5pPr marL="2747433" indent="-512233" algn="ctr" defTabSz="825500">
+              <a:spcBef>
+                <a:spcPts val="0"/>
+              </a:spcBef>
+              <a:buClrTx/>
+              <a:defRPr sz="4400">
+                <a:latin typeface="Graphik Medium"/>
+                <a:ea typeface="Graphik Medium"/>
+                <a:cs typeface="Graphik Medium"/>
+                <a:sym typeface="Graphik Medium"/>
+              </a:defRPr>
+            </a:lvl5pPr>
           </a:lstStyle>
           <a:p>
             <a:pPr/>
@@ -1659,6 +1803,30 @@
               <a:t>Atribución</a:t>
             </a:r>
           </a:p>
+          <a:p>
+            <a:pPr lvl="1"/>
+            <a:r>
+              <a:t/>
+            </a:r>
+          </a:p>
+          <a:p>
+            <a:pPr lvl="2"/>
+            <a:r>
+              <a:t/>
+            </a:r>
+          </a:p>
+          <a:p>
+            <a:pPr lvl="3"/>
+            <a:r>
+              <a:t/>
+            </a:r>
+          </a:p>
+          <a:p>
+            <a:pPr lvl="4"/>
+            <a:r>
+              <a:t/>
+            </a:r>
+          </a:p>
         </p:txBody>
       </p:sp>
       <p:sp>
@@ -1666,22 +1834,23 @@
           <p:cNvPr id="136" name="Nivel de texto 1…"/>
           <p:cNvSpPr txBox="1"/>
           <p:nvPr>
-            <p:ph type="body" sz="half" idx="1" hasCustomPrompt="1"/>
+            <p:ph type="body" sz="half" idx="21" hasCustomPrompt="1"/>
           </p:nvPr>
         </p:nvSpPr>
         <p:spPr>
           <a:xfrm>
             <a:off x="1270000" y="5141969"/>
-            <a:ext cx="21844000" cy="3430191"/>
-          </a:xfrm>
-          <a:prstGeom prst="rect">
-            <a:avLst/>
-          </a:prstGeom>
-        </p:spPr>
-        <p:txBody>
-          <a:bodyPr anchor="ctr"/>
-          <a:lstStyle>
-            <a:lvl1pPr marL="0" indent="0" algn="ctr">
+            <a:ext cx="21844000" cy="3430192"/>
+          </a:xfrm>
+          <a:prstGeom prst="rect">
+            <a:avLst/>
+          </a:prstGeom>
+        </p:spPr>
+        <p:txBody>
+          <a:bodyPr numCol="1" spcCol="38100" anchor="ctr"/>
+          <a:lstStyle/>
+          <a:p>
+            <a:pPr lvl="4" marL="0" indent="1536191" algn="ctr" defTabSz="1365504">
               <a:lnSpc>
                 <a:spcPct val="80000"/>
               </a:lnSpc>
@@ -1691,7 +1860,7 @@
               <a:buClrTx/>
               <a:buSzTx/>
               <a:buNone/>
-              <a:defRPr spc="-168" sz="8400">
+              <a:defRPr spc="-112" sz="4704">
                 <a:gradFill flip="none" rotWithShape="1">
                   <a:gsLst>
                     <a:gs pos="0">
@@ -1703,153 +1872,15 @@
                   </a:gsLst>
                   <a:lin ang="3960000" scaled="0"/>
                 </a:gradFill>
-                <a:latin typeface="+mn-lt"/>
-                <a:ea typeface="+mn-ea"/>
-                <a:cs typeface="+mn-cs"/>
+                <a:latin typeface="Graphik Semibold"/>
+                <a:ea typeface="Graphik Semibold"/>
+                <a:cs typeface="Graphik Semibold"/>
                 <a:sym typeface="Graphik Semibold"/>
               </a:defRPr>
-            </a:lvl1pPr>
-            <a:lvl2pPr marL="0" indent="457200" algn="ctr">
-              <a:lnSpc>
-                <a:spcPct val="80000"/>
-              </a:lnSpc>
-              <a:spcBef>
-                <a:spcPts val="0"/>
-              </a:spcBef>
-              <a:buClrTx/>
-              <a:buSzTx/>
-              <a:buNone/>
-              <a:defRPr spc="-168" sz="8400">
-                <a:gradFill flip="none" rotWithShape="1">
-                  <a:gsLst>
-                    <a:gs pos="0">
-                      <a:srgbClr val="FF00D8"/>
-                    </a:gs>
-                    <a:gs pos="100000">
-                      <a:srgbClr val="FF542E"/>
-                    </a:gs>
-                  </a:gsLst>
-                  <a:lin ang="3960000" scaled="0"/>
-                </a:gradFill>
-                <a:latin typeface="+mn-lt"/>
-                <a:ea typeface="+mn-ea"/>
-                <a:cs typeface="+mn-cs"/>
-                <a:sym typeface="Graphik Semibold"/>
-              </a:defRPr>
-            </a:lvl2pPr>
-            <a:lvl3pPr marL="0" indent="914400" algn="ctr">
-              <a:lnSpc>
-                <a:spcPct val="80000"/>
-              </a:lnSpc>
-              <a:spcBef>
-                <a:spcPts val="0"/>
-              </a:spcBef>
-              <a:buClrTx/>
-              <a:buSzTx/>
-              <a:buNone/>
-              <a:defRPr spc="-168" sz="8400">
-                <a:gradFill flip="none" rotWithShape="1">
-                  <a:gsLst>
-                    <a:gs pos="0">
-                      <a:srgbClr val="FF00D8"/>
-                    </a:gs>
-                    <a:gs pos="100000">
-                      <a:srgbClr val="FF542E"/>
-                    </a:gs>
-                  </a:gsLst>
-                  <a:lin ang="3960000" scaled="0"/>
-                </a:gradFill>
-                <a:latin typeface="+mn-lt"/>
-                <a:ea typeface="+mn-ea"/>
-                <a:cs typeface="+mn-cs"/>
-                <a:sym typeface="Graphik Semibold"/>
-              </a:defRPr>
-            </a:lvl3pPr>
-            <a:lvl4pPr marL="0" indent="1371600" algn="ctr">
-              <a:lnSpc>
-                <a:spcPct val="80000"/>
-              </a:lnSpc>
-              <a:spcBef>
-                <a:spcPts val="0"/>
-              </a:spcBef>
-              <a:buClrTx/>
-              <a:buSzTx/>
-              <a:buNone/>
-              <a:defRPr spc="-168" sz="8400">
-                <a:gradFill flip="none" rotWithShape="1">
-                  <a:gsLst>
-                    <a:gs pos="0">
-                      <a:srgbClr val="FF00D8"/>
-                    </a:gs>
-                    <a:gs pos="100000">
-                      <a:srgbClr val="FF542E"/>
-                    </a:gs>
-                  </a:gsLst>
-                  <a:lin ang="3960000" scaled="0"/>
-                </a:gradFill>
-                <a:latin typeface="+mn-lt"/>
-                <a:ea typeface="+mn-ea"/>
-                <a:cs typeface="+mn-cs"/>
-                <a:sym typeface="Graphik Semibold"/>
-              </a:defRPr>
-            </a:lvl4pPr>
-            <a:lvl5pPr marL="0" indent="1828800" algn="ctr">
-              <a:lnSpc>
-                <a:spcPct val="80000"/>
-              </a:lnSpc>
-              <a:spcBef>
-                <a:spcPts val="0"/>
-              </a:spcBef>
-              <a:buClrTx/>
-              <a:buSzTx/>
-              <a:buNone/>
-              <a:defRPr spc="-168" sz="8400">
-                <a:gradFill flip="none" rotWithShape="1">
-                  <a:gsLst>
-                    <a:gs pos="0">
-                      <a:srgbClr val="FF00D8"/>
-                    </a:gs>
-                    <a:gs pos="100000">
-                      <a:srgbClr val="FF542E"/>
-                    </a:gs>
-                  </a:gsLst>
-                  <a:lin ang="3960000" scaled="0"/>
-                </a:gradFill>
-                <a:latin typeface="+mn-lt"/>
-                <a:ea typeface="+mn-ea"/>
-                <a:cs typeface="+mn-cs"/>
-                <a:sym typeface="Graphik Semibold"/>
-              </a:defRPr>
-            </a:lvl5pPr>
-          </a:lstStyle>
-          <a:p>
-            <a:pPr/>
-            <a:r>
-              <a:t>“Frase celebre”</a:t>
-            </a:r>
-          </a:p>
-          <a:p>
-            <a:pPr lvl="1"/>
-            <a:r>
-              <a:t/>
-            </a:r>
-          </a:p>
-          <a:p>
-            <a:pPr lvl="2"/>
-            <a:r>
-              <a:t/>
-            </a:r>
-          </a:p>
-          <a:p>
-            <a:pPr lvl="3"/>
-            <a:r>
-              <a:t/>
-            </a:r>
-          </a:p>
-          <a:p>
-            <a:pPr lvl="4"/>
-            <a:r>
-              <a:t/>
+            </a:pPr>
+            <a:r>
+              <a:t>“Frase celebre”
+</a:t>
             </a:r>
           </a:p>
         </p:txBody>
@@ -1920,7 +1951,7 @@
           </a:prstGeom>
         </p:spPr>
         <p:txBody>
-          <a:bodyPr lIns="91439" tIns="45719" rIns="91439" bIns="45719">
+          <a:bodyPr lIns="91439" tIns="45719" rIns="91439" bIns="45719" numCol="1" spcCol="38100">
             <a:noAutofit/>
           </a:bodyPr>
           <a:lstStyle/>
@@ -1947,7 +1978,7 @@
           </a:prstGeom>
         </p:spPr>
         <p:txBody>
-          <a:bodyPr lIns="91439" tIns="45719" rIns="91439" bIns="45719">
+          <a:bodyPr lIns="91439" tIns="45719" rIns="91439" bIns="45719" numCol="1" spcCol="38100">
             <a:noAutofit/>
           </a:bodyPr>
           <a:lstStyle/>
@@ -1974,7 +2005,7 @@
           </a:prstGeom>
         </p:spPr>
         <p:txBody>
-          <a:bodyPr lIns="91439" tIns="45719" rIns="91439" bIns="45719">
+          <a:bodyPr lIns="91439" tIns="45719" rIns="91439" bIns="45719" numCol="1" spcCol="38100">
             <a:noAutofit/>
           </a:bodyPr>
           <a:lstStyle/>
@@ -2042,14 +2073,14 @@
         <p:spPr>
           <a:xfrm>
             <a:off x="0" y="-1270000"/>
-            <a:ext cx="24384000" cy="16256001"/>
-          </a:xfrm>
-          <a:prstGeom prst="rect">
-            <a:avLst/>
-          </a:prstGeom>
-        </p:spPr>
-        <p:txBody>
-          <a:bodyPr lIns="91439" tIns="45719" rIns="91439" bIns="45719">
+            <a:ext cx="24384000" cy="16256002"/>
+          </a:xfrm>
+          <a:prstGeom prst="rect">
+            <a:avLst/>
+          </a:prstGeom>
+        </p:spPr>
+        <p:txBody>
+          <a:bodyPr lIns="91439" tIns="45719" rIns="91439" bIns="45719" numCol="1" spcCol="38100">
             <a:noAutofit/>
           </a:bodyPr>
           <a:lstStyle/>
@@ -2173,14 +2204,14 @@
         <p:spPr>
           <a:xfrm>
             <a:off x="0" y="-1270000"/>
-            <a:ext cx="24384000" cy="16256001"/>
-          </a:xfrm>
-          <a:prstGeom prst="rect">
-            <a:avLst/>
-          </a:prstGeom>
-        </p:spPr>
-        <p:txBody>
-          <a:bodyPr lIns="91439" tIns="45719" rIns="91439" bIns="45719">
+            <a:ext cx="24384000" cy="16256002"/>
+          </a:xfrm>
+          <a:prstGeom prst="rect">
+            <a:avLst/>
+          </a:prstGeom>
+        </p:spPr>
+        <p:txBody>
+          <a:bodyPr lIns="91439" tIns="45719" rIns="91439" bIns="45719" numCol="1" spcCol="38100">
             <a:noAutofit/>
           </a:bodyPr>
           <a:lstStyle/>
@@ -2191,23 +2222,23 @@
       </p:sp>
       <p:sp>
         <p:nvSpPr>
-          <p:cNvPr id="22" name="Autor y fecha"/>
+          <p:cNvPr id="22" name="Nivel de texto 1…"/>
           <p:cNvSpPr txBox="1"/>
           <p:nvPr>
-            <p:ph type="body" sz="quarter" idx="22" hasCustomPrompt="1"/>
+            <p:ph type="body" sz="quarter" idx="1" hasCustomPrompt="1"/>
           </p:nvPr>
         </p:nvSpPr>
         <p:spPr>
           <a:xfrm>
             <a:off x="1270000" y="12166600"/>
-            <a:ext cx="21844000" cy="694055"/>
-          </a:xfrm>
-          <a:prstGeom prst="rect">
-            <a:avLst/>
-          </a:prstGeom>
-        </p:spPr>
-        <p:txBody>
-          <a:bodyPr/>
+            <a:ext cx="21844000" cy="694056"/>
+          </a:xfrm>
+          <a:prstGeom prst="rect">
+            <a:avLst/>
+          </a:prstGeom>
+        </p:spPr>
+        <p:txBody>
+          <a:bodyPr numCol="1" spcCol="38100"/>
           <a:lstStyle>
             <a:lvl1pPr marL="0" indent="0" algn="ctr" defTabSz="825500">
               <a:spcBef>
@@ -2226,11 +2257,95 @@
                 <a:sym typeface="Graphik Medium"/>
               </a:defRPr>
             </a:lvl1pPr>
+            <a:lvl2pPr marL="966258" indent="-407458" algn="ctr" defTabSz="825500">
+              <a:spcBef>
+                <a:spcPts val="0"/>
+              </a:spcBef>
+              <a:buClrTx/>
+              <a:defRPr sz="3500">
+                <a:solidFill>
+                  <a:srgbClr val="FFFFFF"/>
+                </a:solidFill>
+                <a:latin typeface="Graphik Medium"/>
+                <a:ea typeface="Graphik Medium"/>
+                <a:cs typeface="Graphik Medium"/>
+                <a:sym typeface="Graphik Medium"/>
+              </a:defRPr>
+            </a:lvl2pPr>
+            <a:lvl3pPr marL="1525058" indent="-407458" algn="ctr" defTabSz="825500">
+              <a:spcBef>
+                <a:spcPts val="0"/>
+              </a:spcBef>
+              <a:buClrTx/>
+              <a:defRPr sz="3500">
+                <a:solidFill>
+                  <a:srgbClr val="FFFFFF"/>
+                </a:solidFill>
+                <a:latin typeface="Graphik Medium"/>
+                <a:ea typeface="Graphik Medium"/>
+                <a:cs typeface="Graphik Medium"/>
+                <a:sym typeface="Graphik Medium"/>
+              </a:defRPr>
+            </a:lvl3pPr>
+            <a:lvl4pPr marL="2083858" indent="-407458" algn="ctr" defTabSz="825500">
+              <a:spcBef>
+                <a:spcPts val="0"/>
+              </a:spcBef>
+              <a:buClrTx/>
+              <a:defRPr sz="3500">
+                <a:solidFill>
+                  <a:srgbClr val="FFFFFF"/>
+                </a:solidFill>
+                <a:latin typeface="Graphik Medium"/>
+                <a:ea typeface="Graphik Medium"/>
+                <a:cs typeface="Graphik Medium"/>
+                <a:sym typeface="Graphik Medium"/>
+              </a:defRPr>
+            </a:lvl4pPr>
+            <a:lvl5pPr marL="2642658" indent="-407458" algn="ctr" defTabSz="825500">
+              <a:spcBef>
+                <a:spcPts val="0"/>
+              </a:spcBef>
+              <a:buClrTx/>
+              <a:defRPr sz="3500">
+                <a:solidFill>
+                  <a:srgbClr val="FFFFFF"/>
+                </a:solidFill>
+                <a:latin typeface="Graphik Medium"/>
+                <a:ea typeface="Graphik Medium"/>
+                <a:cs typeface="Graphik Medium"/>
+                <a:sym typeface="Graphik Medium"/>
+              </a:defRPr>
+            </a:lvl5pPr>
           </a:lstStyle>
           <a:p>
             <a:pPr/>
             <a:r>
               <a:t>Autor y fecha</a:t>
+            </a:r>
+          </a:p>
+          <a:p>
+            <a:pPr lvl="1"/>
+            <a:r>
+              <a:t/>
+            </a:r>
+          </a:p>
+          <a:p>
+            <a:pPr lvl="2"/>
+            <a:r>
+              <a:t/>
+            </a:r>
+          </a:p>
+          <a:p>
+            <a:pPr lvl="3"/>
+            <a:r>
+              <a:t/>
+            </a:r>
+          </a:p>
+          <a:p>
+            <a:pPr lvl="4"/>
+            <a:r>
+              <a:t/>
             </a:r>
           </a:p>
         </p:txBody>
@@ -2279,7 +2394,7 @@
           <p:cNvPr id="24" name="Nivel de texto 1…"/>
           <p:cNvSpPr txBox="1"/>
           <p:nvPr>
-            <p:ph type="body" sz="quarter" idx="1" hasCustomPrompt="1"/>
+            <p:ph type="body" sz="quarter" idx="22" hasCustomPrompt="1"/>
           </p:nvPr>
         </p:nvSpPr>
         <p:spPr>
@@ -2292,7 +2407,7 @@
           </a:prstGeom>
         </p:spPr>
         <p:txBody>
-          <a:bodyPr/>
+          <a:bodyPr numCol="1" spcCol="38100"/>
           <a:lstStyle>
             <a:lvl1pPr marL="0" indent="0" algn="ctr" defTabSz="825500">
               <a:spcBef>
@@ -2311,103 +2426,11 @@
                 <a:sym typeface="Graphik Medium"/>
               </a:defRPr>
             </a:lvl1pPr>
-            <a:lvl2pPr marL="0" indent="0" algn="ctr" defTabSz="825500">
-              <a:spcBef>
-                <a:spcPts val="0"/>
-              </a:spcBef>
-              <a:buClrTx/>
-              <a:buSzTx/>
-              <a:buNone/>
-              <a:defRPr sz="6400">
-                <a:solidFill>
-                  <a:srgbClr val="FFFFFF"/>
-                </a:solidFill>
-                <a:latin typeface="Graphik Medium"/>
-                <a:ea typeface="Graphik Medium"/>
-                <a:cs typeface="Graphik Medium"/>
-                <a:sym typeface="Graphik Medium"/>
-              </a:defRPr>
-            </a:lvl2pPr>
-            <a:lvl3pPr marL="0" indent="0" algn="ctr" defTabSz="825500">
-              <a:spcBef>
-                <a:spcPts val="0"/>
-              </a:spcBef>
-              <a:buClrTx/>
-              <a:buSzTx/>
-              <a:buNone/>
-              <a:defRPr sz="6400">
-                <a:solidFill>
-                  <a:srgbClr val="FFFFFF"/>
-                </a:solidFill>
-                <a:latin typeface="Graphik Medium"/>
-                <a:ea typeface="Graphik Medium"/>
-                <a:cs typeface="Graphik Medium"/>
-                <a:sym typeface="Graphik Medium"/>
-              </a:defRPr>
-            </a:lvl3pPr>
-            <a:lvl4pPr marL="0" indent="0" algn="ctr" defTabSz="825500">
-              <a:spcBef>
-                <a:spcPts val="0"/>
-              </a:spcBef>
-              <a:buClrTx/>
-              <a:buSzTx/>
-              <a:buNone/>
-              <a:defRPr sz="6400">
-                <a:solidFill>
-                  <a:srgbClr val="FFFFFF"/>
-                </a:solidFill>
-                <a:latin typeface="Graphik Medium"/>
-                <a:ea typeface="Graphik Medium"/>
-                <a:cs typeface="Graphik Medium"/>
-                <a:sym typeface="Graphik Medium"/>
-              </a:defRPr>
-            </a:lvl4pPr>
-            <a:lvl5pPr marL="0" indent="0" algn="ctr" defTabSz="825500">
-              <a:spcBef>
-                <a:spcPts val="0"/>
-              </a:spcBef>
-              <a:buClrTx/>
-              <a:buSzTx/>
-              <a:buNone/>
-              <a:defRPr sz="6400">
-                <a:solidFill>
-                  <a:srgbClr val="FFFFFF"/>
-                </a:solidFill>
-                <a:latin typeface="Graphik Medium"/>
-                <a:ea typeface="Graphik Medium"/>
-                <a:cs typeface="Graphik Medium"/>
-                <a:sym typeface="Graphik Medium"/>
-              </a:defRPr>
-            </a:lvl5pPr>
           </a:lstStyle>
           <a:p>
             <a:pPr/>
             <a:r>
               <a:t>Subtítulo de presentación</a:t>
-            </a:r>
-          </a:p>
-          <a:p>
-            <a:pPr lvl="1"/>
-            <a:r>
-              <a:t/>
-            </a:r>
-          </a:p>
-          <a:p>
-            <a:pPr lvl="2"/>
-            <a:r>
-              <a:t/>
-            </a:r>
-          </a:p>
-          <a:p>
-            <a:pPr lvl="3"/>
-            <a:r>
-              <a:t/>
-            </a:r>
-          </a:p>
-          <a:p>
-            <a:pPr lvl="4"/>
-            <a:r>
-              <a:t/>
             </a:r>
           </a:p>
         </p:txBody>
@@ -2486,7 +2509,7 @@
           </a:prstGeom>
         </p:spPr>
         <p:txBody>
-          <a:bodyPr lIns="91439" tIns="45719" rIns="91439" bIns="45719">
+          <a:bodyPr lIns="91439" tIns="45719" rIns="91439" bIns="45719" numCol="1" spcCol="38100">
             <a:noAutofit/>
           </a:bodyPr>
           <a:lstStyle/>
@@ -2505,8 +2528,8 @@
         </p:nvSpPr>
         <p:spPr>
           <a:xfrm>
-            <a:off x="1270000" y="3885108"/>
-            <a:ext cx="9652000" cy="3200203"/>
+            <a:off x="1270000" y="3885107"/>
+            <a:ext cx="9652000" cy="3200204"/>
           </a:xfrm>
           <a:prstGeom prst="rect">
             <a:avLst/>
@@ -2557,7 +2580,7 @@
           </a:prstGeom>
         </p:spPr>
         <p:txBody>
-          <a:bodyPr/>
+          <a:bodyPr numCol="1" spcCol="38100"/>
           <a:lstStyle>
             <a:lvl1pPr marL="0" indent="0" algn="ctr" defTabSz="825500">
               <a:spcBef>
@@ -2573,7 +2596,7 @@
                 <a:sym typeface="Graphik Medium"/>
               </a:defRPr>
             </a:lvl1pPr>
-            <a:lvl2pPr marL="0" indent="457200" algn="ctr" defTabSz="825500">
+            <a:lvl2pPr marL="0" indent="0" algn="ctr" defTabSz="825500">
               <a:spcBef>
                 <a:spcPts val="0"/>
               </a:spcBef>
@@ -2587,7 +2610,7 @@
                 <a:sym typeface="Graphik Medium"/>
               </a:defRPr>
             </a:lvl2pPr>
-            <a:lvl3pPr marL="0" indent="914400" algn="ctr" defTabSz="825500">
+            <a:lvl3pPr marL="0" indent="0" algn="ctr" defTabSz="825500">
               <a:spcBef>
                 <a:spcPts val="0"/>
               </a:spcBef>
@@ -2601,7 +2624,7 @@
                 <a:sym typeface="Graphik Medium"/>
               </a:defRPr>
             </a:lvl3pPr>
-            <a:lvl4pPr marL="0" indent="1371600" algn="ctr" defTabSz="825500">
+            <a:lvl4pPr marL="0" indent="0" algn="ctr" defTabSz="825500">
               <a:spcBef>
                 <a:spcPts val="0"/>
               </a:spcBef>
@@ -2615,7 +2638,7 @@
                 <a:sym typeface="Graphik Medium"/>
               </a:defRPr>
             </a:lvl4pPr>
-            <a:lvl5pPr marL="0" indent="1828800" algn="ctr" defTabSz="825500">
+            <a:lvl5pPr marL="0" indent="0" algn="ctr" defTabSz="825500">
               <a:spcBef>
                 <a:spcPts val="0"/>
               </a:spcBef>
@@ -2719,6 +2742,10 @@
           </p:nvPr>
         </p:nvSpPr>
         <p:spPr>
+          <a:xfrm>
+            <a:off x="1270000" y="812800"/>
+            <a:ext cx="21844000" cy="1557438"/>
+          </a:xfrm>
           <a:prstGeom prst="rect">
             <a:avLst/>
           </a:prstGeom>
@@ -2736,10 +2763,10 @@
       </p:sp>
       <p:sp>
         <p:nvSpPr>
-          <p:cNvPr id="43" name="Subtítulo de diapositiva"/>
+          <p:cNvPr id="43" name="Nivel de texto 1…"/>
           <p:cNvSpPr txBox="1"/>
           <p:nvPr>
-            <p:ph type="body" sz="quarter" idx="21" hasCustomPrompt="1"/>
+            <p:ph type="body" sz="quarter" idx="1" hasCustomPrompt="1"/>
           </p:nvPr>
         </p:nvSpPr>
         <p:spPr>
@@ -2752,7 +2779,7 @@
           </a:prstGeom>
         </p:spPr>
         <p:txBody>
-          <a:bodyPr/>
+          <a:bodyPr numCol="1" spcCol="38100"/>
           <a:lstStyle>
             <a:lvl1pPr marL="0" indent="0" algn="ctr" defTabSz="825500">
               <a:spcBef>
@@ -2768,6 +2795,54 @@
                 <a:sym typeface="Graphik Medium"/>
               </a:defRPr>
             </a:lvl1pPr>
+            <a:lvl2pPr marL="1187450" indent="-628650" algn="ctr" defTabSz="825500">
+              <a:spcBef>
+                <a:spcPts val="0"/>
+              </a:spcBef>
+              <a:buClrTx/>
+              <a:defRPr sz="5400">
+                <a:latin typeface="Graphik Medium"/>
+                <a:ea typeface="Graphik Medium"/>
+                <a:cs typeface="Graphik Medium"/>
+                <a:sym typeface="Graphik Medium"/>
+              </a:defRPr>
+            </a:lvl2pPr>
+            <a:lvl3pPr marL="1746250" indent="-628650" algn="ctr" defTabSz="825500">
+              <a:spcBef>
+                <a:spcPts val="0"/>
+              </a:spcBef>
+              <a:buClrTx/>
+              <a:defRPr sz="5400">
+                <a:latin typeface="Graphik Medium"/>
+                <a:ea typeface="Graphik Medium"/>
+                <a:cs typeface="Graphik Medium"/>
+                <a:sym typeface="Graphik Medium"/>
+              </a:defRPr>
+            </a:lvl3pPr>
+            <a:lvl4pPr marL="2305050" indent="-628650" algn="ctr" defTabSz="825500">
+              <a:spcBef>
+                <a:spcPts val="0"/>
+              </a:spcBef>
+              <a:buClrTx/>
+              <a:defRPr sz="5400">
+                <a:latin typeface="Graphik Medium"/>
+                <a:ea typeface="Graphik Medium"/>
+                <a:cs typeface="Graphik Medium"/>
+                <a:sym typeface="Graphik Medium"/>
+              </a:defRPr>
+            </a:lvl4pPr>
+            <a:lvl5pPr marL="2863850" indent="-628650" algn="ctr" defTabSz="825500">
+              <a:spcBef>
+                <a:spcPts val="0"/>
+              </a:spcBef>
+              <a:buClrTx/>
+              <a:defRPr sz="5400">
+                <a:latin typeface="Graphik Medium"/>
+                <a:ea typeface="Graphik Medium"/>
+                <a:cs typeface="Graphik Medium"/>
+                <a:sym typeface="Graphik Medium"/>
+              </a:defRPr>
+            </a:lvl5pPr>
           </a:lstStyle>
           <a:p>
             <a:pPr/>
@@ -2775,6 +2850,30 @@
               <a:t>Subtítulo de diapositiva</a:t>
             </a:r>
           </a:p>
+          <a:p>
+            <a:pPr lvl="1"/>
+            <a:r>
+              <a:t/>
+            </a:r>
+          </a:p>
+          <a:p>
+            <a:pPr lvl="2"/>
+            <a:r>
+              <a:t/>
+            </a:r>
+          </a:p>
+          <a:p>
+            <a:pPr lvl="3"/>
+            <a:r>
+              <a:t/>
+            </a:r>
+          </a:p>
+          <a:p>
+            <a:pPr lvl="4"/>
+            <a:r>
+              <a:t/>
+            </a:r>
+          </a:p>
         </p:txBody>
       </p:sp>
       <p:sp>
@@ -2782,45 +2881,25 @@
           <p:cNvPr id="44" name="Nivel de texto 1…"/>
           <p:cNvSpPr txBox="1"/>
           <p:nvPr>
-            <p:ph type="body" idx="1" hasCustomPrompt="1"/>
+            <p:ph type="body" idx="21" hasCustomPrompt="1"/>
           </p:nvPr>
         </p:nvSpPr>
         <p:spPr>
-          <a:prstGeom prst="rect">
-            <a:avLst/>
-          </a:prstGeom>
-        </p:spPr>
-        <p:txBody>
-          <a:bodyPr/>
+          <a:xfrm>
+            <a:off x="1270000" y="4267200"/>
+            <a:ext cx="21844000" cy="8432800"/>
+          </a:xfrm>
+          <a:prstGeom prst="rect">
+            <a:avLst/>
+          </a:prstGeom>
+        </p:spPr>
+        <p:txBody>
+          <a:bodyPr numCol="1" spcCol="38100"/>
           <a:lstStyle/>
           <a:p>
             <a:pPr/>
             <a:r>
               <a:t>Texto en viñeta de diapositiva</a:t>
-            </a:r>
-          </a:p>
-          <a:p>
-            <a:pPr lvl="1"/>
-            <a:r>
-              <a:t/>
-            </a:r>
-          </a:p>
-          <a:p>
-            <a:pPr lvl="2"/>
-            <a:r>
-              <a:t/>
-            </a:r>
-          </a:p>
-          <a:p>
-            <a:pPr lvl="3"/>
-            <a:r>
-              <a:t/>
-            </a:r>
-          </a:p>
-          <a:p>
-            <a:pPr lvl="4"/>
-            <a:r>
-              <a:t/>
             </a:r>
           </a:p>
         </p:txBody>
@@ -2882,16 +2961,12 @@
           </p:nvPr>
         </p:nvSpPr>
         <p:spPr>
-          <a:xfrm>
-            <a:off x="1270000" y="4269316"/>
-            <a:ext cx="21844000" cy="8432801"/>
-          </a:xfrm>
-          <a:prstGeom prst="rect">
-            <a:avLst/>
-          </a:prstGeom>
-        </p:spPr>
-        <p:txBody>
-          <a:bodyPr numCol="2" spcCol="1092200"/>
+          <a:prstGeom prst="rect">
+            <a:avLst/>
+          </a:prstGeom>
+        </p:spPr>
+        <p:txBody>
+          <a:bodyPr/>
           <a:lstStyle/>
           <a:p>
             <a:pPr/>
@@ -2991,7 +3066,7 @@
           </a:prstGeom>
         </p:spPr>
         <p:txBody>
-          <a:bodyPr lIns="91439" tIns="45719" rIns="91439" bIns="45719">
+          <a:bodyPr lIns="91439" tIns="45719" rIns="91439" bIns="45719" numCol="1" spcCol="38100">
             <a:noAutofit/>
           </a:bodyPr>
           <a:lstStyle/>
@@ -3062,7 +3137,7 @@
           </a:prstGeom>
         </p:spPr>
         <p:txBody>
-          <a:bodyPr/>
+          <a:bodyPr numCol="1" spcCol="38100"/>
           <a:lstStyle/>
           <a:p>
             <a:pPr/>
@@ -3114,7 +3189,7 @@
           </a:prstGeom>
         </p:spPr>
         <p:txBody>
-          <a:bodyPr/>
+          <a:bodyPr numCol="1" spcCol="38100"/>
           <a:lstStyle>
             <a:lvl1pPr marL="0" indent="0" algn="ctr" defTabSz="825500">
               <a:spcBef>
@@ -3249,7 +3324,7 @@
           </a:prstGeom>
         </p:spPr>
         <p:txBody>
-          <a:bodyPr/>
+          <a:bodyPr numCol="1" spcCol="38100"/>
           <a:lstStyle/>
           <a:p>
             <a:pPr/>
@@ -3301,7 +3376,7 @@
           </a:prstGeom>
         </p:spPr>
         <p:txBody>
-          <a:bodyPr/>
+          <a:bodyPr numCol="1" spcCol="38100"/>
           <a:lstStyle>
             <a:lvl1pPr marL="0" indent="0" algn="ctr" defTabSz="825500">
               <a:spcBef>
@@ -3436,7 +3511,7 @@
           </a:prstGeom>
         </p:spPr>
         <p:txBody>
-          <a:bodyPr/>
+          <a:bodyPr numCol="1" spcCol="38100"/>
           <a:lstStyle/>
           <a:p>
             <a:pPr/>
@@ -3488,7 +3563,7 @@
           </a:prstGeom>
         </p:spPr>
         <p:txBody>
-          <a:bodyPr/>
+          <a:bodyPr numCol="1" spcCol="38100"/>
           <a:lstStyle>
             <a:lvl1pPr marL="0" indent="0" algn="ctr" defTabSz="825500">
               <a:spcBef>
@@ -3665,16 +3740,16 @@
       </p:grpSpPr>
       <p:sp>
         <p:nvSpPr>
-          <p:cNvPr id="2" name="Título de diapositiva"/>
+          <p:cNvPr id="2" name="Nivel de texto 1…"/>
           <p:cNvSpPr txBox="1"/>
           <p:nvPr>
-            <p:ph type="title" hasCustomPrompt="1"/>
+            <p:ph type="body" idx="1" hasCustomPrompt="1"/>
           </p:nvPr>
         </p:nvSpPr>
         <p:spPr>
           <a:xfrm>
-            <a:off x="1270000" y="812800"/>
-            <a:ext cx="21844000" cy="1557437"/>
+            <a:off x="1270000" y="4269316"/>
+            <a:ext cx="21844000" cy="8432801"/>
           </a:xfrm>
           <a:prstGeom prst="rect">
             <a:avLst/>
@@ -3689,30 +3764,54 @@
           </a:extLst>
         </p:spPr>
         <p:txBody>
-          <a:bodyPr lIns="50800" tIns="50800" rIns="50800" bIns="50800" anchor="b">
+          <a:bodyPr lIns="50800" tIns="50800" rIns="50800" bIns="50800" numCol="2" spcCol="1092200">
             <a:normAutofit fontScale="100000" lnSpcReduction="0"/>
           </a:bodyPr>
           <a:lstStyle/>
           <a:p>
             <a:pPr/>
             <a:r>
-              <a:t>Título de diapositiva</a:t>
-            </a:r>
-          </a:p>
-        </p:txBody>
-      </p:sp>
-      <p:sp>
-        <p:nvSpPr>
-          <p:cNvPr id="3" name="Nivel de texto 1…"/>
+              <a:t>Texto en viñeta de diapositiva</a:t>
+            </a:r>
+          </a:p>
+          <a:p>
+            <a:pPr lvl="1"/>
+            <a:r>
+              <a:t/>
+            </a:r>
+          </a:p>
+          <a:p>
+            <a:pPr lvl="2"/>
+            <a:r>
+              <a:t/>
+            </a:r>
+          </a:p>
+          <a:p>
+            <a:pPr lvl="3"/>
+            <a:r>
+              <a:t/>
+            </a:r>
+          </a:p>
+          <a:p>
+            <a:pPr lvl="4"/>
+            <a:r>
+              <a:t/>
+            </a:r>
+          </a:p>
+        </p:txBody>
+      </p:sp>
+      <p:sp>
+        <p:nvSpPr>
+          <p:cNvPr id="3" name="Texto del título"/>
           <p:cNvSpPr txBox="1"/>
           <p:nvPr>
-            <p:ph type="body" idx="1" hasCustomPrompt="1"/>
+            <p:ph type="title"/>
           </p:nvPr>
         </p:nvSpPr>
         <p:spPr>
           <a:xfrm>
-            <a:off x="1270000" y="4267200"/>
-            <a:ext cx="21844000" cy="8432800"/>
+            <a:off x="3653366" y="0"/>
+            <a:ext cx="19507201" cy="3673475"/>
           </a:xfrm>
           <a:prstGeom prst="rect">
             <a:avLst/>
@@ -3727,38 +3826,14 @@
           </a:extLst>
         </p:spPr>
         <p:txBody>
-          <a:bodyPr lIns="50800" tIns="50800" rIns="50800" bIns="50800">
+          <a:bodyPr lIns="50800" tIns="50800" rIns="50800" bIns="50800" anchor="b">
             <a:normAutofit fontScale="100000" lnSpcReduction="0"/>
           </a:bodyPr>
           <a:lstStyle/>
           <a:p>
             <a:pPr/>
             <a:r>
-              <a:t>Texto en viñeta de diapositiva</a:t>
-            </a:r>
-          </a:p>
-          <a:p>
-            <a:pPr lvl="1"/>
-            <a:r>
-              <a:t/>
-            </a:r>
-          </a:p>
-          <a:p>
-            <a:pPr lvl="2"/>
-            <a:r>
-              <a:t/>
-            </a:r>
-          </a:p>
-          <a:p>
-            <a:pPr lvl="3"/>
-            <a:r>
-              <a:t/>
-            </a:r>
-          </a:p>
-          <a:p>
-            <a:pPr lvl="4"/>
-            <a:r>
-              <a:t/>
+              <a:t>Texto del título</a:t>
             </a:r>
           </a:p>
         </p:txBody>
@@ -3773,8 +3848,8 @@
         </p:nvSpPr>
         <p:spPr>
           <a:xfrm>
-            <a:off x="11977623" y="13081000"/>
-            <a:ext cx="416053" cy="467107"/>
+            <a:off x="11977623" y="13081001"/>
+            <a:ext cx="416053" cy="467106"/>
           </a:xfrm>
           <a:prstGeom prst="rect">
             <a:avLst/>
@@ -3792,7 +3867,12 @@
               <a:spcBef>
                 <a:spcPts val="0"/>
               </a:spcBef>
-              <a:defRPr sz="2200"/>
+              <a:defRPr sz="2200">
+                <a:latin typeface="Graphik"/>
+                <a:ea typeface="Graphik"/>
+                <a:cs typeface="Graphik"/>
+                <a:sym typeface="Graphik"/>
+              </a:defRPr>
             </a:lvl1pPr>
           </a:lstStyle>
           <a:p>
@@ -3846,13 +3926,13 @@
             <a:srgbClr val="000000"/>
           </a:solidFill>
           <a:uFillTx/>
-          <a:latin typeface="+mn-lt"/>
-          <a:ea typeface="+mn-ea"/>
-          <a:cs typeface="+mn-cs"/>
+          <a:latin typeface="Graphik Semibold"/>
+          <a:ea typeface="Graphik Semibold"/>
+          <a:cs typeface="Graphik Semibold"/>
           <a:sym typeface="Graphik Semibold"/>
         </a:defRPr>
       </a:lvl1pPr>
-      <a:lvl2pPr marL="0" marR="0" indent="457200" algn="ctr" defTabSz="825500" rtl="0" latinLnBrk="0">
+      <a:lvl2pPr marL="0" marR="0" indent="0" algn="ctr" defTabSz="825500" rtl="0" latinLnBrk="0">
         <a:lnSpc>
           <a:spcPct val="80000"/>
         </a:lnSpc>
@@ -3872,13 +3952,13 @@
             <a:srgbClr val="000000"/>
           </a:solidFill>
           <a:uFillTx/>
-          <a:latin typeface="+mn-lt"/>
-          <a:ea typeface="+mn-ea"/>
-          <a:cs typeface="+mn-cs"/>
+          <a:latin typeface="Graphik Semibold"/>
+          <a:ea typeface="Graphik Semibold"/>
+          <a:cs typeface="Graphik Semibold"/>
           <a:sym typeface="Graphik Semibold"/>
         </a:defRPr>
       </a:lvl2pPr>
-      <a:lvl3pPr marL="0" marR="0" indent="914400" algn="ctr" defTabSz="825500" rtl="0" latinLnBrk="0">
+      <a:lvl3pPr marL="0" marR="0" indent="0" algn="ctr" defTabSz="825500" rtl="0" latinLnBrk="0">
         <a:lnSpc>
           <a:spcPct val="80000"/>
         </a:lnSpc>
@@ -3898,13 +3978,13 @@
             <a:srgbClr val="000000"/>
           </a:solidFill>
           <a:uFillTx/>
-          <a:latin typeface="+mn-lt"/>
-          <a:ea typeface="+mn-ea"/>
-          <a:cs typeface="+mn-cs"/>
+          <a:latin typeface="Graphik Semibold"/>
+          <a:ea typeface="Graphik Semibold"/>
+          <a:cs typeface="Graphik Semibold"/>
           <a:sym typeface="Graphik Semibold"/>
         </a:defRPr>
       </a:lvl3pPr>
-      <a:lvl4pPr marL="0" marR="0" indent="1371600" algn="ctr" defTabSz="825500" rtl="0" latinLnBrk="0">
+      <a:lvl4pPr marL="0" marR="0" indent="0" algn="ctr" defTabSz="825500" rtl="0" latinLnBrk="0">
         <a:lnSpc>
           <a:spcPct val="80000"/>
         </a:lnSpc>
@@ -3924,13 +4004,13 @@
             <a:srgbClr val="000000"/>
           </a:solidFill>
           <a:uFillTx/>
-          <a:latin typeface="+mn-lt"/>
-          <a:ea typeface="+mn-ea"/>
-          <a:cs typeface="+mn-cs"/>
+          <a:latin typeface="Graphik Semibold"/>
+          <a:ea typeface="Graphik Semibold"/>
+          <a:cs typeface="Graphik Semibold"/>
           <a:sym typeface="Graphik Semibold"/>
         </a:defRPr>
       </a:lvl4pPr>
-      <a:lvl5pPr marL="0" marR="0" indent="1828800" algn="ctr" defTabSz="825500" rtl="0" latinLnBrk="0">
+      <a:lvl5pPr marL="0" marR="0" indent="0" algn="ctr" defTabSz="825500" rtl="0" latinLnBrk="0">
         <a:lnSpc>
           <a:spcPct val="80000"/>
         </a:lnSpc>
@@ -3950,13 +4030,13 @@
             <a:srgbClr val="000000"/>
           </a:solidFill>
           <a:uFillTx/>
-          <a:latin typeface="+mn-lt"/>
-          <a:ea typeface="+mn-ea"/>
-          <a:cs typeface="+mn-cs"/>
+          <a:latin typeface="Graphik Semibold"/>
+          <a:ea typeface="Graphik Semibold"/>
+          <a:cs typeface="Graphik Semibold"/>
           <a:sym typeface="Graphik Semibold"/>
         </a:defRPr>
       </a:lvl5pPr>
-      <a:lvl6pPr marL="0" marR="0" indent="2286000" algn="ctr" defTabSz="825500" rtl="0" latinLnBrk="0">
+      <a:lvl6pPr marL="0" marR="0" indent="0" algn="ctr" defTabSz="825500" rtl="0" latinLnBrk="0">
         <a:lnSpc>
           <a:spcPct val="80000"/>
         </a:lnSpc>
@@ -3976,13 +4056,13 @@
             <a:srgbClr val="000000"/>
           </a:solidFill>
           <a:uFillTx/>
-          <a:latin typeface="+mn-lt"/>
-          <a:ea typeface="+mn-ea"/>
-          <a:cs typeface="+mn-cs"/>
+          <a:latin typeface="Graphik Semibold"/>
+          <a:ea typeface="Graphik Semibold"/>
+          <a:cs typeface="Graphik Semibold"/>
           <a:sym typeface="Graphik Semibold"/>
         </a:defRPr>
       </a:lvl6pPr>
-      <a:lvl7pPr marL="0" marR="0" indent="2743200" algn="ctr" defTabSz="825500" rtl="0" latinLnBrk="0">
+      <a:lvl7pPr marL="0" marR="0" indent="0" algn="ctr" defTabSz="825500" rtl="0" latinLnBrk="0">
         <a:lnSpc>
           <a:spcPct val="80000"/>
         </a:lnSpc>
@@ -4002,13 +4082,13 @@
             <a:srgbClr val="000000"/>
           </a:solidFill>
           <a:uFillTx/>
-          <a:latin typeface="+mn-lt"/>
-          <a:ea typeface="+mn-ea"/>
-          <a:cs typeface="+mn-cs"/>
+          <a:latin typeface="Graphik Semibold"/>
+          <a:ea typeface="Graphik Semibold"/>
+          <a:cs typeface="Graphik Semibold"/>
           <a:sym typeface="Graphik Semibold"/>
         </a:defRPr>
       </a:lvl7pPr>
-      <a:lvl8pPr marL="0" marR="0" indent="3200400" algn="ctr" defTabSz="825500" rtl="0" latinLnBrk="0">
+      <a:lvl8pPr marL="0" marR="0" indent="0" algn="ctr" defTabSz="825500" rtl="0" latinLnBrk="0">
         <a:lnSpc>
           <a:spcPct val="80000"/>
         </a:lnSpc>
@@ -4028,13 +4108,13 @@
             <a:srgbClr val="000000"/>
           </a:solidFill>
           <a:uFillTx/>
-          <a:latin typeface="+mn-lt"/>
-          <a:ea typeface="+mn-ea"/>
-          <a:cs typeface="+mn-cs"/>
+          <a:latin typeface="Graphik Semibold"/>
+          <a:ea typeface="Graphik Semibold"/>
+          <a:cs typeface="Graphik Semibold"/>
           <a:sym typeface="Graphik Semibold"/>
         </a:defRPr>
       </a:lvl8pPr>
-      <a:lvl9pPr marL="0" marR="0" indent="3657600" algn="ctr" defTabSz="825500" rtl="0" latinLnBrk="0">
+      <a:lvl9pPr marL="0" marR="0" indent="0" algn="ctr" defTabSz="825500" rtl="0" latinLnBrk="0">
         <a:lnSpc>
           <a:spcPct val="80000"/>
         </a:lnSpc>
@@ -4054,9 +4134,9 @@
             <a:srgbClr val="000000"/>
           </a:solidFill>
           <a:uFillTx/>
-          <a:latin typeface="+mn-lt"/>
-          <a:ea typeface="+mn-ea"/>
-          <a:cs typeface="+mn-cs"/>
+          <a:latin typeface="Graphik Semibold"/>
+          <a:ea typeface="Graphik Semibold"/>
+          <a:cs typeface="Graphik Semibold"/>
           <a:sym typeface="Graphik Semibold"/>
         </a:defRPr>
       </a:lvl9pPr>
@@ -4342,7 +4422,7 @@
           <a:sym typeface="Graphik"/>
         </a:defRPr>
       </a:lvl1pPr>
-      <a:lvl2pPr marL="0" marR="0" indent="457200" algn="ctr" defTabSz="825500" rtl="0" latinLnBrk="0">
+      <a:lvl2pPr marL="0" marR="0" indent="0" algn="ctr" defTabSz="825500" rtl="0" latinLnBrk="0">
         <a:lnSpc>
           <a:spcPct val="100000"/>
         </a:lnSpc>
@@ -4368,7 +4448,7 @@
           <a:sym typeface="Graphik"/>
         </a:defRPr>
       </a:lvl2pPr>
-      <a:lvl3pPr marL="0" marR="0" indent="914400" algn="ctr" defTabSz="825500" rtl="0" latinLnBrk="0">
+      <a:lvl3pPr marL="0" marR="0" indent="0" algn="ctr" defTabSz="825500" rtl="0" latinLnBrk="0">
         <a:lnSpc>
           <a:spcPct val="100000"/>
         </a:lnSpc>
@@ -4394,7 +4474,7 @@
           <a:sym typeface="Graphik"/>
         </a:defRPr>
       </a:lvl3pPr>
-      <a:lvl4pPr marL="0" marR="0" indent="1371600" algn="ctr" defTabSz="825500" rtl="0" latinLnBrk="0">
+      <a:lvl4pPr marL="0" marR="0" indent="0" algn="ctr" defTabSz="825500" rtl="0" latinLnBrk="0">
         <a:lnSpc>
           <a:spcPct val="100000"/>
         </a:lnSpc>
@@ -4420,7 +4500,7 @@
           <a:sym typeface="Graphik"/>
         </a:defRPr>
       </a:lvl4pPr>
-      <a:lvl5pPr marL="0" marR="0" indent="1828800" algn="ctr" defTabSz="825500" rtl="0" latinLnBrk="0">
+      <a:lvl5pPr marL="0" marR="0" indent="0" algn="ctr" defTabSz="825500" rtl="0" latinLnBrk="0">
         <a:lnSpc>
           <a:spcPct val="100000"/>
         </a:lnSpc>
@@ -4446,7 +4526,7 @@
           <a:sym typeface="Graphik"/>
         </a:defRPr>
       </a:lvl5pPr>
-      <a:lvl6pPr marL="0" marR="0" indent="2286000" algn="ctr" defTabSz="825500" rtl="0" latinLnBrk="0">
+      <a:lvl6pPr marL="0" marR="0" indent="0" algn="ctr" defTabSz="825500" rtl="0" latinLnBrk="0">
         <a:lnSpc>
           <a:spcPct val="100000"/>
         </a:lnSpc>
@@ -4472,7 +4552,7 @@
           <a:sym typeface="Graphik"/>
         </a:defRPr>
       </a:lvl6pPr>
-      <a:lvl7pPr marL="0" marR="0" indent="2743200" algn="ctr" defTabSz="825500" rtl="0" latinLnBrk="0">
+      <a:lvl7pPr marL="0" marR="0" indent="0" algn="ctr" defTabSz="825500" rtl="0" latinLnBrk="0">
         <a:lnSpc>
           <a:spcPct val="100000"/>
         </a:lnSpc>
@@ -4498,7 +4578,7 @@
           <a:sym typeface="Graphik"/>
         </a:defRPr>
       </a:lvl7pPr>
-      <a:lvl8pPr marL="0" marR="0" indent="3200400" algn="ctr" defTabSz="825500" rtl="0" latinLnBrk="0">
+      <a:lvl8pPr marL="0" marR="0" indent="0" algn="ctr" defTabSz="825500" rtl="0" latinLnBrk="0">
         <a:lnSpc>
           <a:spcPct val="100000"/>
         </a:lnSpc>
@@ -4524,7 +4604,7 @@
           <a:sym typeface="Graphik"/>
         </a:defRPr>
       </a:lvl8pPr>
-      <a:lvl9pPr marL="0" marR="0" indent="3657600" algn="ctr" defTabSz="825500" rtl="0" latinLnBrk="0">
+      <a:lvl9pPr marL="0" marR="0" indent="0" algn="ctr" defTabSz="825500" rtl="0" latinLnBrk="0">
         <a:lnSpc>
           <a:spcPct val="100000"/>
         </a:lnSpc>
@@ -4600,14 +4680,14 @@
             <a:normAutofit fontScale="100000" lnSpcReduction="0"/>
           </a:bodyPr>
           <a:lstStyle>
-            <a:lvl1pPr algn="ctr" defTabSz="2438338">
+            <a:lvl1pPr algn="ctr" defTabSz="2438337">
               <a:lnSpc>
                 <a:spcPct val="90000"/>
               </a:lnSpc>
               <a:spcBef>
                 <a:spcPts val="0"/>
               </a:spcBef>
-              <a:defRPr spc="-510" sz="17000">
+              <a:defRPr spc="-600" sz="17000">
                 <a:gradFill flip="none" rotWithShape="1">
                   <a:gsLst>
                     <a:gs pos="0">
@@ -4619,10 +4699,6 @@
                   </a:gsLst>
                   <a:lin ang="3960000" scaled="0"/>
                 </a:gradFill>
-                <a:latin typeface="+mn-lt"/>
-                <a:ea typeface="+mn-ea"/>
-                <a:cs typeface="+mn-cs"/>
-                <a:sym typeface="Graphik Semibold"/>
               </a:defRPr>
             </a:lvl1pPr>
           </a:lstStyle>
@@ -4639,13 +4715,46 @@
           <p:cNvPr id="172" name="Franco Callipo"/>
           <p:cNvSpPr txBox="1"/>
           <p:nvPr>
-            <p:ph type="body" idx="21"/>
+            <p:ph type="body" sz="quarter" idx="1"/>
           </p:nvPr>
         </p:nvSpPr>
         <p:spPr>
-          <a:prstGeom prst="rect">
-            <a:avLst/>
-          </a:prstGeom>
+          <a:xfrm>
+            <a:off x="1270000" y="12160429"/>
+            <a:ext cx="21844000" cy="694057"/>
+          </a:xfrm>
+          <a:prstGeom prst="rect">
+            <a:avLst/>
+          </a:prstGeom>
+        </p:spPr>
+        <p:txBody>
+          <a:bodyPr/>
+          <a:lstStyle/>
+          <a:p>
+            <a:pPr/>
+            <a:r>
+              <a:t>Franco Callipo</a:t>
+            </a:r>
+          </a:p>
+        </p:txBody>
+      </p:sp>
+      <p:sp>
+        <p:nvSpPr>
+          <p:cNvPr id="173" name="Parte 3"/>
+          <p:cNvSpPr txBox="1"/>
+          <p:nvPr/>
+        </p:nvSpPr>
+        <p:spPr>
+          <a:xfrm>
+            <a:off x="1270000" y="7449673"/>
+            <a:ext cx="21844000" cy="2512354"/>
+          </a:xfrm>
+          <a:prstGeom prst="rect">
+            <a:avLst/>
+          </a:prstGeom>
+          <a:ln w="12700">
+            <a:miter lim="400000"/>
+          </a:ln>
           <a:extLst>
             <a:ext uri="{C572A759-6A51-4108-AA02-DFA0A04FC94B}">
               <ma14:wrappingTextBoxFlag xmlns:ma14="http://schemas.microsoft.com/office/mac/drawingml/2011/main" val="1"/>
@@ -4653,38 +4762,20 @@
           </a:extLst>
         </p:spPr>
         <p:txBody>
-          <a:bodyPr/>
-          <a:lstStyle/>
-          <a:p>
-            <a:pPr/>
-            <a:r>
-              <a:t>Franco Callipo</a:t>
-            </a:r>
-          </a:p>
-        </p:txBody>
-      </p:sp>
-      <p:sp>
-        <p:nvSpPr>
-          <p:cNvPr id="173" name="Parte 3"/>
-          <p:cNvSpPr txBox="1"/>
-          <p:nvPr>
-            <p:ph type="subTitle" sz="quarter" idx="1"/>
-          </p:nvPr>
-        </p:nvSpPr>
-        <p:spPr>
-          <a:xfrm>
-            <a:off x="1270000" y="7449673"/>
-            <a:ext cx="21844000" cy="2512353"/>
-          </a:xfrm>
-          <a:prstGeom prst="rect">
-            <a:avLst/>
-          </a:prstGeom>
-        </p:spPr>
-        <p:txBody>
-          <a:bodyPr/>
+          <a:bodyPr lIns="50800" tIns="50800" rIns="50800" bIns="50800">
+            <a:normAutofit fontScale="100000" lnSpcReduction="0"/>
+          </a:bodyPr>
           <a:lstStyle>
-            <a:lvl1pPr>
-              <a:defRPr sz="5000"/>
+            <a:lvl1pPr algn="ctr" defTabSz="825500">
+              <a:spcBef>
+                <a:spcPts val="0"/>
+              </a:spcBef>
+              <a:defRPr sz="5000">
+                <a:latin typeface="Graphik Medium"/>
+                <a:ea typeface="Graphik Medium"/>
+                <a:cs typeface="Graphik Medium"/>
+                <a:sym typeface="Graphik Medium"/>
+              </a:defRPr>
             </a:lvl1pPr>
           </a:lstStyle>
           <a:p>
@@ -4731,8 +4822,8 @@
         </p:nvSpPr>
         <p:spPr>
           <a:xfrm>
-            <a:off x="-1905000" y="821134"/>
-            <a:ext cx="9652000" cy="1549401"/>
+            <a:off x="-1905000" y="821133"/>
+            <a:ext cx="9652000" cy="1549403"/>
           </a:xfrm>
           <a:prstGeom prst="rect">
             <a:avLst/>
@@ -4740,7 +4831,11 @@
         </p:spPr>
         <p:txBody>
           <a:bodyPr/>
-          <a:lstStyle/>
+          <a:lstStyle>
+            <a:lvl1pPr>
+              <a:defRPr spc="-300"/>
+            </a:lvl1pPr>
+          </a:lstStyle>
           <a:p>
             <a:pPr/>
             <a:r>
@@ -4758,7 +4853,7 @@
         <p:spPr>
           <a:xfrm>
             <a:off x="-2630496" y="2123519"/>
-            <a:ext cx="9652001" cy="1016001"/>
+            <a:ext cx="9652001" cy="1016002"/>
           </a:xfrm>
           <a:prstGeom prst="rect">
             <a:avLst/>
@@ -4805,8 +4900,8 @@
         </p:nvSpPr>
         <p:spPr>
           <a:xfrm>
-            <a:off x="1218158" y="3818414"/>
-            <a:ext cx="21947684" cy="1854300"/>
+            <a:off x="1218158" y="3818413"/>
+            <a:ext cx="21947684" cy="1854301"/>
           </a:xfrm>
           <a:prstGeom prst="rect">
             <a:avLst/>
@@ -4831,6 +4926,12 @@
               </a:buClr>
               <a:buSzPct val="100000"/>
               <a:buChar char="•"/>
+              <a:defRPr>
+                <a:latin typeface="Graphik"/>
+                <a:ea typeface="Graphik"/>
+                <a:cs typeface="Graphik"/>
+                <a:sym typeface="Graphik"/>
+              </a:defRPr>
             </a:lvl1pPr>
           </a:lstStyle>
           <a:p>
@@ -4859,8 +4960,8 @@
         </p:blipFill>
         <p:spPr>
           <a:xfrm>
-            <a:off x="7591381" y="7687660"/>
-            <a:ext cx="9201238" cy="1586421"/>
+            <a:off x="7591380" y="7687660"/>
+            <a:ext cx="9201240" cy="1586422"/>
           </a:xfrm>
           <a:prstGeom prst="rect">
             <a:avLst/>
@@ -4906,8 +5007,8 @@
         </p:nvSpPr>
         <p:spPr>
           <a:xfrm>
-            <a:off x="-1905000" y="821134"/>
-            <a:ext cx="9652000" cy="1549401"/>
+            <a:off x="-1905000" y="821133"/>
+            <a:ext cx="9652000" cy="1549403"/>
           </a:xfrm>
           <a:prstGeom prst="rect">
             <a:avLst/>
@@ -4915,7 +5016,11 @@
         </p:spPr>
         <p:txBody>
           <a:bodyPr/>
-          <a:lstStyle/>
+          <a:lstStyle>
+            <a:lvl1pPr>
+              <a:defRPr spc="-300"/>
+            </a:lvl1pPr>
+          </a:lstStyle>
           <a:p>
             <a:pPr/>
             <a:r>
@@ -4933,7 +5038,7 @@
         <p:spPr>
           <a:xfrm>
             <a:off x="-1690696" y="2123519"/>
-            <a:ext cx="9652001" cy="1016001"/>
+            <a:ext cx="9652001" cy="1016002"/>
           </a:xfrm>
           <a:prstGeom prst="rect">
             <a:avLst/>
@@ -4980,8 +5085,8 @@
         </p:nvSpPr>
         <p:spPr>
           <a:xfrm>
-            <a:off x="1218158" y="3818414"/>
-            <a:ext cx="21947684" cy="1854300"/>
+            <a:off x="1218158" y="3818413"/>
+            <a:ext cx="21947684" cy="1854301"/>
           </a:xfrm>
           <a:prstGeom prst="rect">
             <a:avLst/>
@@ -5006,6 +5111,12 @@
               </a:buClr>
               <a:buSzPct val="100000"/>
               <a:buChar char="•"/>
+              <a:defRPr>
+                <a:latin typeface="Graphik"/>
+                <a:ea typeface="Graphik"/>
+                <a:cs typeface="Graphik"/>
+                <a:sym typeface="Graphik"/>
+              </a:defRPr>
             </a:lvl1pPr>
           </a:lstStyle>
           <a:p>
@@ -5035,7 +5146,7 @@
         <p:spPr>
           <a:xfrm>
             <a:off x="7555624" y="7120593"/>
-            <a:ext cx="9272752" cy="3248240"/>
+            <a:ext cx="9272752" cy="3248241"/>
           </a:xfrm>
           <a:prstGeom prst="rect">
             <a:avLst/>
@@ -5080,7 +5191,7 @@
         <p:spPr>
           <a:xfrm>
             <a:off x="-2770196" y="2123519"/>
-            <a:ext cx="9652001" cy="1016001"/>
+            <a:ext cx="9652001" cy="1016002"/>
           </a:xfrm>
           <a:prstGeom prst="rect">
             <a:avLst/>
@@ -5127,8 +5238,8 @@
         </p:nvSpPr>
         <p:spPr>
           <a:xfrm>
-            <a:off x="-1905000" y="821134"/>
-            <a:ext cx="9652000" cy="1549401"/>
+            <a:off x="-1905000" y="821133"/>
+            <a:ext cx="9652000" cy="1549403"/>
           </a:xfrm>
           <a:prstGeom prst="rect">
             <a:avLst/>
@@ -5154,7 +5265,7 @@
               <a:spcBef>
                 <a:spcPts val="0"/>
               </a:spcBef>
-              <a:defRPr spc="-252" sz="8400">
+              <a:defRPr spc="-300" sz="8400">
                 <a:gradFill flip="none" rotWithShape="1">
                   <a:gsLst>
                     <a:gs pos="0">
@@ -5166,10 +5277,6 @@
                   </a:gsLst>
                   <a:lin ang="3960000" scaled="0"/>
                 </a:gradFill>
-                <a:latin typeface="+mn-lt"/>
-                <a:ea typeface="+mn-ea"/>
-                <a:cs typeface="+mn-cs"/>
-                <a:sym typeface="Graphik Semibold"/>
               </a:defRPr>
             </a:lvl1pPr>
           </a:lstStyle>
@@ -5189,8 +5296,8 @@
         </p:nvSpPr>
         <p:spPr>
           <a:xfrm>
-            <a:off x="1218158" y="3818414"/>
-            <a:ext cx="21947684" cy="1854300"/>
+            <a:off x="1218158" y="3818413"/>
+            <a:ext cx="21947684" cy="1854301"/>
           </a:xfrm>
           <a:prstGeom prst="rect">
             <a:avLst/>
@@ -5215,6 +5322,12 @@
               </a:buClr>
               <a:buSzPct val="100000"/>
               <a:buChar char="•"/>
+              <a:defRPr>
+                <a:latin typeface="Graphik"/>
+                <a:ea typeface="Graphik"/>
+                <a:cs typeface="Graphik"/>
+                <a:sym typeface="Graphik"/>
+              </a:defRPr>
             </a:lvl1pPr>
           </a:lstStyle>
           <a:p>
@@ -5260,7 +5373,7 @@
         <p:spPr>
           <a:xfrm>
             <a:off x="-3024196" y="2123519"/>
-            <a:ext cx="9652001" cy="1016001"/>
+            <a:ext cx="9652001" cy="1016002"/>
           </a:xfrm>
           <a:prstGeom prst="rect">
             <a:avLst/>
@@ -5307,8 +5420,8 @@
         </p:nvSpPr>
         <p:spPr>
           <a:xfrm>
-            <a:off x="-1905000" y="821134"/>
-            <a:ext cx="9652000" cy="1549401"/>
+            <a:off x="-1905000" y="821133"/>
+            <a:ext cx="9652000" cy="1549403"/>
           </a:xfrm>
           <a:prstGeom prst="rect">
             <a:avLst/>
@@ -5334,7 +5447,7 @@
               <a:spcBef>
                 <a:spcPts val="0"/>
               </a:spcBef>
-              <a:defRPr spc="-252" sz="8400">
+              <a:defRPr spc="-300" sz="8400">
                 <a:gradFill flip="none" rotWithShape="1">
                   <a:gsLst>
                     <a:gs pos="0">
@@ -5346,10 +5459,6 @@
                   </a:gsLst>
                   <a:lin ang="3960000" scaled="0"/>
                 </a:gradFill>
-                <a:latin typeface="+mn-lt"/>
-                <a:ea typeface="+mn-ea"/>
-                <a:cs typeface="+mn-cs"/>
-                <a:sym typeface="Graphik Semibold"/>
               </a:defRPr>
             </a:lvl1pPr>
           </a:lstStyle>
@@ -5369,8 +5478,8 @@
         </p:nvSpPr>
         <p:spPr>
           <a:xfrm>
-            <a:off x="1218158" y="3818414"/>
-            <a:ext cx="21947684" cy="1854300"/>
+            <a:off x="1218158" y="3818413"/>
+            <a:ext cx="21947684" cy="1854301"/>
           </a:xfrm>
           <a:prstGeom prst="rect">
             <a:avLst/>
@@ -5395,6 +5504,12 @@
               </a:buClr>
               <a:buSzPct val="100000"/>
               <a:buChar char="•"/>
+              <a:defRPr>
+                <a:latin typeface="Graphik"/>
+                <a:ea typeface="Graphik"/>
+                <a:cs typeface="Graphik"/>
+                <a:sym typeface="Graphik"/>
+              </a:defRPr>
             </a:lvl1pPr>
           </a:lstStyle>
           <a:p>
@@ -5423,8 +5538,8 @@
         </p:blipFill>
         <p:spPr>
           <a:xfrm>
-            <a:off x="7778743" y="5743810"/>
-            <a:ext cx="8826513" cy="7046780"/>
+            <a:off x="7778743" y="5743809"/>
+            <a:ext cx="8826514" cy="7046781"/>
           </a:xfrm>
           <a:prstGeom prst="rect">
             <a:avLst/>
@@ -5475,7 +5590,11 @@
         </p:spPr>
         <p:txBody>
           <a:bodyPr/>
-          <a:lstStyle/>
+          <a:lstStyle>
+            <a:lvl1pPr>
+              <a:defRPr spc="-400"/>
+            </a:lvl1pPr>
+          </a:lstStyle>
           <a:p>
             <a:pPr/>
             <a:r>
@@ -5520,8 +5639,8 @@
         </p:nvSpPr>
         <p:spPr>
           <a:xfrm>
-            <a:off x="-1600200" y="821134"/>
-            <a:ext cx="9652000" cy="1549401"/>
+            <a:off x="-1600200" y="821133"/>
+            <a:ext cx="9652000" cy="1549403"/>
           </a:xfrm>
           <a:prstGeom prst="rect">
             <a:avLst/>
@@ -5529,7 +5648,11 @@
         </p:spPr>
         <p:txBody>
           <a:bodyPr/>
-          <a:lstStyle/>
+          <a:lstStyle>
+            <a:lvl1pPr>
+              <a:defRPr spc="-300"/>
+            </a:lvl1pPr>
+          </a:lstStyle>
           <a:p>
             <a:pPr/>
             <a:r>
@@ -5548,8 +5671,8 @@
         </p:nvSpPr>
         <p:spPr>
           <a:xfrm>
-            <a:off x="1270000" y="4267200"/>
-            <a:ext cx="22365990" cy="2015431"/>
+            <a:off x="1270000" y="4267199"/>
+            <a:ext cx="22365990" cy="2015433"/>
           </a:xfrm>
           <a:prstGeom prst="rect">
             <a:avLst/>
@@ -5584,7 +5707,7 @@
         <p:spPr>
           <a:xfrm>
             <a:off x="-355600" y="2123519"/>
-            <a:ext cx="9652000" cy="1016001"/>
+            <a:ext cx="9652000" cy="1016002"/>
           </a:xfrm>
           <a:prstGeom prst="rect">
             <a:avLst/>
@@ -5624,8 +5747,8 @@
         </p:blipFill>
         <p:spPr>
           <a:xfrm>
-            <a:off x="3253386" y="6282594"/>
-            <a:ext cx="18399218" cy="5969213"/>
+            <a:off x="3253385" y="6282594"/>
+            <a:ext cx="18399219" cy="5969214"/>
           </a:xfrm>
           <a:prstGeom prst="rect">
             <a:avLst/>
@@ -5676,7 +5799,11 @@
         </p:spPr>
         <p:txBody>
           <a:bodyPr/>
-          <a:lstStyle/>
+          <a:lstStyle>
+            <a:lvl1pPr>
+              <a:defRPr spc="-400"/>
+            </a:lvl1pPr>
+          </a:lstStyle>
           <a:p>
             <a:pPr/>
             <a:r>
@@ -5721,8 +5848,8 @@
         </p:nvSpPr>
         <p:spPr>
           <a:xfrm>
-            <a:off x="1079500" y="821134"/>
-            <a:ext cx="9652000" cy="1549401"/>
+            <a:off x="1079500" y="821133"/>
+            <a:ext cx="9652000" cy="1549403"/>
           </a:xfrm>
           <a:prstGeom prst="rect">
             <a:avLst/>
@@ -5732,7 +5859,7 @@
           <a:bodyPr/>
           <a:lstStyle>
             <a:lvl1pPr defTabSz="792479">
-              <a:defRPr spc="-241" sz="8064"/>
+              <a:defRPr spc="-300" sz="8000"/>
             </a:lvl1pPr>
           </a:lstStyle>
           <a:p>
@@ -5753,8 +5880,8 @@
         </p:nvSpPr>
         <p:spPr>
           <a:xfrm>
-            <a:off x="1270000" y="4267200"/>
-            <a:ext cx="14149586" cy="8097739"/>
+            <a:off x="1270000" y="4267199"/>
+            <a:ext cx="14149586" cy="8097741"/>
           </a:xfrm>
           <a:prstGeom prst="rect">
             <a:avLst/>
@@ -5768,7 +5895,7 @@
               <a:spcBef>
                 <a:spcPts val="2300"/>
               </a:spcBef>
-              <a:defRPr sz="4752"/>
+              <a:defRPr sz="4700"/>
             </a:pPr>
             <a:r>
               <a:t>row (Los elementos se visualizan de izquierda a derecha, valor por defecto)</a:t>
@@ -5779,7 +5906,7 @@
               <a:spcBef>
                 <a:spcPts val="2300"/>
               </a:spcBef>
-              <a:defRPr sz="4752"/>
+              <a:defRPr sz="4700"/>
             </a:pPr>
             <a:r>
               <a:t>row-reverse (Los elementos se visualizan de derecha a izquierda)</a:t>
@@ -5790,7 +5917,7 @@
               <a:spcBef>
                 <a:spcPts val="2300"/>
               </a:spcBef>
-              <a:defRPr sz="4752"/>
+              <a:defRPr sz="4700"/>
             </a:pPr>
             <a:r>
               <a:t>column (Los elementos se visualizan de arriba hacia abajo)</a:t>
@@ -5801,15 +5928,12 @@
               <a:spcBef>
                 <a:spcPts val="2300"/>
               </a:spcBef>
-              <a:defRPr sz="4752"/>
+              <a:defRPr sz="4700"/>
             </a:pPr>
             <a:r>
               <a:t>column-reverse (Los elementos se visualizan de abajo hacia arriba) </a:t>
             </a:r>
-            <a:br>
-              <a:rPr sz="1188"/>
-            </a:br>
-            <a:endParaRPr sz="1188"/>
+            <a:br/>
           </a:p>
         </p:txBody>
       </p:sp>
@@ -5824,7 +5948,7 @@
         <p:spPr>
           <a:xfrm>
             <a:off x="-1371600" y="2123519"/>
-            <a:ext cx="9652000" cy="1016001"/>
+            <a:ext cx="9652000" cy="1016002"/>
           </a:xfrm>
           <a:prstGeom prst="rect">
             <a:avLst/>
@@ -5865,7 +5989,7 @@
         <p:spPr>
           <a:xfrm>
             <a:off x="16845278" y="3496950"/>
-            <a:ext cx="6188143" cy="8936350"/>
+            <a:ext cx="6188144" cy="8936350"/>
           </a:xfrm>
           <a:prstGeom prst="rect">
             <a:avLst/>
@@ -5911,8 +6035,8 @@
         </p:nvSpPr>
         <p:spPr>
           <a:xfrm>
-            <a:off x="1079500" y="821134"/>
-            <a:ext cx="9652000" cy="1549401"/>
+            <a:off x="1079500" y="821133"/>
+            <a:ext cx="9652000" cy="1549403"/>
           </a:xfrm>
           <a:prstGeom prst="rect">
             <a:avLst/>
@@ -5922,7 +6046,7 @@
           <a:bodyPr/>
           <a:lstStyle>
             <a:lvl1pPr defTabSz="792479">
-              <a:defRPr spc="-241" sz="8064"/>
+              <a:defRPr spc="-300" sz="8000"/>
             </a:lvl1pPr>
           </a:lstStyle>
           <a:p>
@@ -5943,8 +6067,8 @@
         </p:nvSpPr>
         <p:spPr>
           <a:xfrm>
-            <a:off x="1270000" y="4267200"/>
-            <a:ext cx="13958590" cy="8097739"/>
+            <a:off x="1270000" y="4267199"/>
+            <a:ext cx="13958590" cy="8097741"/>
           </a:xfrm>
           <a:prstGeom prst="rect">
             <a:avLst/>
@@ -5984,7 +6108,7 @@
         <p:spPr>
           <a:xfrm>
             <a:off x="-2044700" y="2123519"/>
-            <a:ext cx="9652000" cy="1016001"/>
+            <a:ext cx="9652000" cy="1016002"/>
           </a:xfrm>
           <a:prstGeom prst="rect">
             <a:avLst/>
@@ -6024,8 +6148,8 @@
         </p:blipFill>
         <p:spPr>
           <a:xfrm>
-            <a:off x="15917161" y="5858410"/>
-            <a:ext cx="8044380" cy="4022190"/>
+            <a:off x="15917161" y="5858409"/>
+            <a:ext cx="8044382" cy="4022191"/>
           </a:xfrm>
           <a:prstGeom prst="rect">
             <a:avLst/>
@@ -6076,7 +6200,11 @@
         </p:spPr>
         <p:txBody>
           <a:bodyPr/>
-          <a:lstStyle/>
+          <a:lstStyle>
+            <a:lvl1pPr>
+              <a:defRPr spc="-400"/>
+            </a:lvl1pPr>
+          </a:lstStyle>
           <a:p>
             <a:pPr/>
             <a:r>
@@ -6126,7 +6254,11 @@
         </p:spPr>
         <p:txBody>
           <a:bodyPr/>
-          <a:lstStyle/>
+          <a:lstStyle>
+            <a:lvl1pPr>
+              <a:defRPr spc="-400"/>
+            </a:lvl1pPr>
+          </a:lstStyle>
           <a:p>
             <a:pPr/>
             <a:r>
@@ -6182,7 +6314,7 @@
           <a:bodyPr/>
           <a:lstStyle>
             <a:lvl1pPr defTabSz="817244">
-              <a:defRPr spc="-249" sz="8316"/>
+              <a:defRPr spc="-300" sz="8300"/>
             </a:lvl1pPr>
           </a:lstStyle>
           <a:p>
@@ -6214,11 +6346,11 @@
           <a:bodyPr/>
           <a:lstStyle/>
           <a:p>
-            <a:pPr marL="530859" indent="-530859" defTabSz="2316479">
+            <a:pPr marL="530859" indent="-530859" defTabSz="2316478">
               <a:spcBef>
                 <a:spcPts val="2200"/>
               </a:spcBef>
-              <a:defRPr sz="4560"/>
+              <a:defRPr sz="4500"/>
             </a:pPr>
             <a:r>
               <a:t>flex-start</a:t>
@@ -6232,11 +6364,11 @@
             </a:r>
           </a:p>
           <a:p>
-            <a:pPr marL="530859" indent="-530859" defTabSz="2316479">
+            <a:pPr marL="530859" indent="-530859" defTabSz="2316478">
               <a:spcBef>
                 <a:spcPts val="2200"/>
               </a:spcBef>
-              <a:defRPr sz="4560"/>
+              <a:defRPr sz="4500"/>
             </a:pPr>
             <a:r>
               <a:t>flex-end</a:t>
@@ -6250,44 +6382,44 @@
             </a:r>
           </a:p>
           <a:p>
-            <a:pPr marL="530859" indent="-530859" defTabSz="2316479">
+            <a:pPr marL="530859" indent="-530859" defTabSz="2316478">
               <a:spcBef>
                 <a:spcPts val="2200"/>
               </a:spcBef>
-              <a:defRPr sz="4560"/>
+              <a:defRPr sz="4500"/>
             </a:pPr>
             <a:r>
               <a:t>center (Agrupa los ítems al centro del eje principal)</a:t>
             </a:r>
           </a:p>
           <a:p>
-            <a:pPr marL="530859" indent="-530859" defTabSz="2316479">
+            <a:pPr marL="530859" indent="-530859" defTabSz="2316478">
               <a:spcBef>
                 <a:spcPts val="2200"/>
               </a:spcBef>
-              <a:defRPr sz="4560"/>
+              <a:defRPr sz="4500"/>
             </a:pPr>
             <a:r>
               <a:t>space-between (Distribuye los ítems dejando el máximo espacio para separarlos)</a:t>
             </a:r>
           </a:p>
           <a:p>
-            <a:pPr marL="530859" indent="-530859" defTabSz="2316479">
+            <a:pPr marL="530859" indent="-530859" defTabSz="2316478">
               <a:spcBef>
                 <a:spcPts val="2200"/>
               </a:spcBef>
-              <a:defRPr sz="4560"/>
+              <a:defRPr sz="4500"/>
             </a:pPr>
             <a:r>
               <a:t>space-around (Distribuye los ítems dejando el mismo espacio alrededor de ellos)</a:t>
             </a:r>
           </a:p>
           <a:p>
-            <a:pPr marL="530859" indent="-530859" defTabSz="2316479">
+            <a:pPr marL="530859" indent="-530859" defTabSz="2316478">
               <a:spcBef>
                 <a:spcPts val="2200"/>
               </a:spcBef>
-              <a:defRPr sz="4560"/>
+              <a:defRPr sz="4500"/>
             </a:pPr>
             <a:r>
               <a:t>space-evenly (Distribuye los ítems dejando el mismo espacio, solapado, a izquierda y derecha)</a:t>
@@ -6306,7 +6438,7 @@
         <p:spPr>
           <a:xfrm>
             <a:off x="-990600" y="2123519"/>
-            <a:ext cx="9652000" cy="1016001"/>
+            <a:ext cx="9652000" cy="1016002"/>
           </a:xfrm>
           <a:prstGeom prst="rect">
             <a:avLst/>
@@ -6346,8 +6478,8 @@
         </p:blipFill>
         <p:spPr>
           <a:xfrm>
-            <a:off x="17629906" y="3736264"/>
-            <a:ext cx="6030679" cy="9147886"/>
+            <a:off x="17629905" y="3736264"/>
+            <a:ext cx="6030680" cy="9147886"/>
           </a:xfrm>
           <a:prstGeom prst="rect">
             <a:avLst/>
@@ -6404,7 +6536,7 @@
           <a:bodyPr/>
           <a:lstStyle>
             <a:lvl1pPr defTabSz="817244">
-              <a:defRPr spc="-249" sz="8316"/>
+              <a:defRPr spc="-300" sz="8300"/>
             </a:lvl1pPr>
           </a:lstStyle>
           <a:p>
@@ -6436,11 +6568,11 @@
           <a:bodyPr/>
           <a:lstStyle/>
           <a:p>
-            <a:pPr marL="530859" indent="-530859" defTabSz="2316479">
+            <a:pPr marL="530859" indent="-530859" defTabSz="2316478">
               <a:spcBef>
                 <a:spcPts val="2200"/>
               </a:spcBef>
-              <a:defRPr sz="4560"/>
+              <a:defRPr sz="4500"/>
             </a:pPr>
             <a:r>
               <a:t>flex-start</a:t>
@@ -6454,22 +6586,22 @@
             </a:r>
           </a:p>
           <a:p>
-            <a:pPr marL="530859" indent="-530859" defTabSz="2316479">
+            <a:pPr marL="530859" indent="-530859" defTabSz="2316478">
               <a:spcBef>
                 <a:spcPts val="2200"/>
               </a:spcBef>
-              <a:defRPr sz="4560"/>
+              <a:defRPr sz="4500"/>
             </a:pPr>
             <a:r>
               <a:t>space-between (Distribuye los ítems desde el inicio hasta el final)</a:t>
             </a:r>
           </a:p>
           <a:p>
-            <a:pPr marL="530859" indent="-530859" defTabSz="2316479">
+            <a:pPr marL="530859" indent="-530859" defTabSz="2316478">
               <a:spcBef>
                 <a:spcPts val="2200"/>
               </a:spcBef>
-              <a:defRPr sz="4560"/>
+              <a:defRPr sz="4500"/>
             </a:pPr>
             <a:r>
               <a:t>flex-end</a:t>
@@ -6483,33 +6615,33 @@
             </a:r>
           </a:p>
           <a:p>
-            <a:pPr marL="530859" indent="-530859" defTabSz="2316479">
+            <a:pPr marL="530859" indent="-530859" defTabSz="2316478">
               <a:spcBef>
                 <a:spcPts val="2200"/>
               </a:spcBef>
-              <a:defRPr sz="4560"/>
+              <a:defRPr sz="4500"/>
             </a:pPr>
             <a:r>
               <a:t>center (Agrupa los ítems al centro del eje principal)</a:t>
             </a:r>
           </a:p>
           <a:p>
-            <a:pPr marL="530859" indent="-530859" defTabSz="2316479">
+            <a:pPr marL="530859" indent="-530859" defTabSz="2316478">
               <a:spcBef>
                 <a:spcPts val="2200"/>
               </a:spcBef>
-              <a:defRPr sz="4560"/>
+              <a:defRPr sz="4500"/>
             </a:pPr>
             <a:r>
               <a:t>stretch (Alinea los ítems estirándolos de modo que cubran desde el inicio hasta el final del contenedor)</a:t>
             </a:r>
           </a:p>
           <a:p>
-            <a:pPr marL="530859" indent="-530859" defTabSz="2316479">
+            <a:pPr marL="530859" indent="-530859" defTabSz="2316478">
               <a:spcBef>
                 <a:spcPts val="2200"/>
               </a:spcBef>
-              <a:defRPr sz="4560"/>
+              <a:defRPr sz="4500"/>
             </a:pPr>
             <a:r>
               <a:t>space-around (Distribuye los ítems dejando el mismo espacio a los lados de cada uno)</a:t>
@@ -6528,7 +6660,7 @@
         <p:spPr>
           <a:xfrm>
             <a:off x="-1270000" y="2123519"/>
-            <a:ext cx="9652000" cy="1016001"/>
+            <a:ext cx="9652000" cy="1016002"/>
           </a:xfrm>
           <a:prstGeom prst="rect">
             <a:avLst/>
@@ -6626,7 +6758,7 @@
           <a:bodyPr/>
           <a:lstStyle>
             <a:lvl1pPr defTabSz="817244">
-              <a:defRPr spc="-249" sz="8316"/>
+              <a:defRPr spc="-300" sz="8300"/>
             </a:lvl1pPr>
           </a:lstStyle>
           <a:p>
@@ -6647,8 +6779,8 @@
         </p:nvSpPr>
         <p:spPr>
           <a:xfrm>
-            <a:off x="1270000" y="4267200"/>
-            <a:ext cx="15851585" cy="8432800"/>
+            <a:off x="1269999" y="4267200"/>
+            <a:ext cx="15851586" cy="8432800"/>
           </a:xfrm>
           <a:prstGeom prst="rect">
             <a:avLst/>
@@ -6721,7 +6853,7 @@
         <p:spPr>
           <a:xfrm>
             <a:off x="-1625600" y="2123519"/>
-            <a:ext cx="9652000" cy="1016001"/>
+            <a:ext cx="9652000" cy="1016002"/>
           </a:xfrm>
           <a:prstGeom prst="rect">
             <a:avLst/>
@@ -6761,8 +6893,8 @@
         </p:blipFill>
         <p:spPr>
           <a:xfrm>
-            <a:off x="17301616" y="3836280"/>
-            <a:ext cx="6360343" cy="7911220"/>
+            <a:off x="17301615" y="3836280"/>
+            <a:ext cx="6360344" cy="7911221"/>
           </a:xfrm>
           <a:prstGeom prst="rect">
             <a:avLst/>
@@ -6813,7 +6945,11 @@
         </p:spPr>
         <p:txBody>
           <a:bodyPr/>
-          <a:lstStyle/>
+          <a:lstStyle>
+            <a:lvl1pPr>
+              <a:defRPr spc="-400"/>
+            </a:lvl1pPr>
+          </a:lstStyle>
           <a:p>
             <a:pPr/>
             <a:r>
@@ -6858,8 +6994,8 @@
         </p:nvSpPr>
         <p:spPr>
           <a:xfrm>
-            <a:off x="-1549919" y="821134"/>
-            <a:ext cx="9652001" cy="1549401"/>
+            <a:off x="-1549919" y="821133"/>
+            <a:ext cx="9652001" cy="1549403"/>
           </a:xfrm>
           <a:prstGeom prst="rect">
             <a:avLst/>
@@ -6867,7 +7003,11 @@
         </p:spPr>
         <p:txBody>
           <a:bodyPr/>
-          <a:lstStyle/>
+          <a:lstStyle>
+            <a:lvl1pPr>
+              <a:defRPr spc="-300"/>
+            </a:lvl1pPr>
+          </a:lstStyle>
           <a:p>
             <a:pPr/>
             <a:r>
@@ -6923,7 +7063,7 @@
           <a:p>
             <a:pPr/>
             <a:r>
-              <a:t>sticky (Es una mezcla entre el relative y el fixed, se utiliza en configuración de apple, con los iconos de cuando buscas algo)</a:t>
+              <a:t>sticky (Es una mezcla entre el relative y el fixed)</a:t>
             </a:r>
           </a:p>
         </p:txBody>
@@ -6963,6 +7103,10 @@
           </p:nvPr>
         </p:nvSpPr>
         <p:spPr>
+          <a:xfrm>
+            <a:off x="1270000" y="4927599"/>
+            <a:ext cx="21844000" cy="3902871"/>
+          </a:xfrm>
           <a:prstGeom prst="rect">
             <a:avLst/>
           </a:prstGeom>
@@ -6971,7 +7115,7 @@
           <a:bodyPr/>
           <a:lstStyle>
             <a:lvl1pPr>
-              <a:defRPr spc="-510" sz="17000"/>
+              <a:defRPr spc="-600" sz="17000"/>
             </a:lvl1pPr>
           </a:lstStyle>
           <a:p>
@@ -7023,7 +7167,11 @@
         </p:spPr>
         <p:txBody>
           <a:bodyPr/>
-          <a:lstStyle/>
+          <a:lstStyle>
+            <a:lvl1pPr>
+              <a:defRPr spc="-400"/>
+            </a:lvl1pPr>
+          </a:lstStyle>
           <a:p>
             <a:pPr/>
             <a:r>
@@ -7073,7 +7221,11 @@
         </p:spPr>
         <p:txBody>
           <a:bodyPr/>
-          <a:lstStyle/>
+          <a:lstStyle>
+            <a:lvl1pPr>
+              <a:defRPr spc="-300"/>
+            </a:lvl1pPr>
+          </a:lstStyle>
           <a:p>
             <a:pPr/>
             <a:r>
@@ -7092,8 +7244,8 @@
         </p:nvSpPr>
         <p:spPr>
           <a:xfrm>
-            <a:off x="1270000" y="3670300"/>
-            <a:ext cx="10431364" cy="8432800"/>
+            <a:off x="1269999" y="3670300"/>
+            <a:ext cx="10431366" cy="8432800"/>
           </a:xfrm>
           <a:prstGeom prst="rect">
             <a:avLst/>
@@ -7140,8 +7292,8 @@
         </p:blipFill>
         <p:spPr>
           <a:xfrm>
-            <a:off x="13358758" y="4264470"/>
-            <a:ext cx="9737176" cy="7244460"/>
+            <a:off x="13358758" y="4264469"/>
+            <a:ext cx="9737177" cy="7244462"/>
           </a:xfrm>
           <a:prstGeom prst="rect">
             <a:avLst/>
@@ -7186,13 +7338,21 @@
           </p:nvPr>
         </p:nvSpPr>
         <p:spPr>
+          <a:xfrm>
+            <a:off x="1270000" y="3906096"/>
+            <a:ext cx="21844000" cy="4488605"/>
+          </a:xfrm>
           <a:prstGeom prst="rect">
             <a:avLst/>
           </a:prstGeom>
         </p:spPr>
         <p:txBody>
           <a:bodyPr/>
-          <a:lstStyle/>
+          <a:lstStyle>
+            <a:lvl1pPr>
+              <a:defRPr spc="-500"/>
+            </a:lvl1pPr>
+          </a:lstStyle>
           <a:p>
             <a:pPr/>
             <a:r>
@@ -7237,8 +7397,8 @@
         </p:nvSpPr>
         <p:spPr>
           <a:xfrm>
-            <a:off x="355600" y="821134"/>
-            <a:ext cx="9652000" cy="1549401"/>
+            <a:off x="355600" y="821133"/>
+            <a:ext cx="9652000" cy="1549403"/>
           </a:xfrm>
           <a:prstGeom prst="rect">
             <a:avLst/>
@@ -7246,7 +7406,11 @@
         </p:spPr>
         <p:txBody>
           <a:bodyPr/>
-          <a:lstStyle/>
+          <a:lstStyle>
+            <a:lvl1pPr>
+              <a:defRPr spc="-300"/>
+            </a:lvl1pPr>
+          </a:lstStyle>
           <a:p>
             <a:pPr/>
             <a:r>
@@ -7331,7 +7495,7 @@
         <p:spPr>
           <a:xfrm>
             <a:off x="-1879600" y="2123519"/>
-            <a:ext cx="9652000" cy="1016001"/>
+            <a:ext cx="9652000" cy="1016002"/>
           </a:xfrm>
           <a:prstGeom prst="rect">
             <a:avLst/>
@@ -7388,13 +7552,21 @@
           </p:nvPr>
         </p:nvSpPr>
         <p:spPr>
+          <a:xfrm>
+            <a:off x="1270000" y="3906096"/>
+            <a:ext cx="21844000" cy="4488605"/>
+          </a:xfrm>
           <a:prstGeom prst="rect">
             <a:avLst/>
           </a:prstGeom>
         </p:spPr>
         <p:txBody>
           <a:bodyPr/>
-          <a:lstStyle/>
+          <a:lstStyle>
+            <a:lvl1pPr>
+              <a:defRPr spc="-500"/>
+            </a:lvl1pPr>
+          </a:lstStyle>
           <a:p>
             <a:pPr/>
             <a:r>
@@ -7439,8 +7611,8 @@
         </p:nvSpPr>
         <p:spPr>
           <a:xfrm>
-            <a:off x="355600" y="821134"/>
-            <a:ext cx="9652000" cy="1549401"/>
+            <a:off x="355600" y="821133"/>
+            <a:ext cx="9652000" cy="1549403"/>
           </a:xfrm>
           <a:prstGeom prst="rect">
             <a:avLst/>
@@ -7448,7 +7620,11 @@
         </p:spPr>
         <p:txBody>
           <a:bodyPr/>
-          <a:lstStyle/>
+          <a:lstStyle>
+            <a:lvl1pPr>
+              <a:defRPr spc="-300"/>
+            </a:lvl1pPr>
+          </a:lstStyle>
           <a:p>
             <a:pPr/>
             <a:r>
@@ -7533,7 +7709,7 @@
         <p:spPr>
           <a:xfrm>
             <a:off x="-2184400" y="2123519"/>
-            <a:ext cx="9652000" cy="1016001"/>
+            <a:ext cx="9652000" cy="1016002"/>
           </a:xfrm>
           <a:prstGeom prst="rect">
             <a:avLst/>
@@ -7596,7 +7772,11 @@
         </p:spPr>
         <p:txBody>
           <a:bodyPr/>
-          <a:lstStyle/>
+          <a:lstStyle>
+            <a:lvl1pPr>
+              <a:defRPr spc="-400"/>
+            </a:lvl1pPr>
+          </a:lstStyle>
           <a:p>
             <a:pPr/>
             <a:r>
@@ -7650,7 +7830,7 @@
         <p:spPr>
           <a:xfrm>
             <a:off x="2288919" y="1517502"/>
-            <a:ext cx="10251170" cy="4853211"/>
+            <a:ext cx="10251170" cy="4853212"/>
           </a:xfrm>
           <a:prstGeom prst="rect">
             <a:avLst/>
@@ -7708,7 +7888,7 @@
         <p:spPr>
           <a:xfrm>
             <a:off x="2288919" y="6788352"/>
-            <a:ext cx="10251170" cy="5829098"/>
+            <a:ext cx="10251170" cy="5829099"/>
           </a:xfrm>
           <a:prstGeom prst="rect">
             <a:avLst/>
@@ -7726,8 +7906,8 @@
         </p:nvSpPr>
         <p:spPr>
           <a:xfrm>
-            <a:off x="14413675" y="5842000"/>
-            <a:ext cx="2057888" cy="1549401"/>
+            <a:off x="14413675" y="5841999"/>
+            <a:ext cx="2057889" cy="1549403"/>
           </a:xfrm>
           <a:custGeom>
             <a:avLst/>
@@ -7889,8 +8069,8 @@
         </p:nvSpPr>
         <p:spPr>
           <a:xfrm>
-            <a:off x="-1905000" y="821134"/>
-            <a:ext cx="9652000" cy="1549401"/>
+            <a:off x="-1905000" y="821133"/>
+            <a:ext cx="9652000" cy="1549403"/>
           </a:xfrm>
           <a:prstGeom prst="rect">
             <a:avLst/>
@@ -7898,7 +8078,11 @@
         </p:spPr>
         <p:txBody>
           <a:bodyPr/>
-          <a:lstStyle/>
+          <a:lstStyle>
+            <a:lvl1pPr>
+              <a:defRPr spc="-300"/>
+            </a:lvl1pPr>
+          </a:lstStyle>
           <a:p>
             <a:pPr/>
             <a:r>
@@ -7916,7 +8100,7 @@
         <p:spPr>
           <a:xfrm>
             <a:off x="-2732096" y="2123519"/>
-            <a:ext cx="9652001" cy="1016001"/>
+            <a:ext cx="9652001" cy="1016002"/>
           </a:xfrm>
           <a:prstGeom prst="rect">
             <a:avLst/>
@@ -7963,8 +8147,8 @@
         </p:nvSpPr>
         <p:spPr>
           <a:xfrm>
-            <a:off x="1218158" y="3818414"/>
-            <a:ext cx="21947684" cy="1854300"/>
+            <a:off x="1218158" y="3818413"/>
+            <a:ext cx="21947684" cy="1854301"/>
           </a:xfrm>
           <a:prstGeom prst="rect">
             <a:avLst/>
@@ -7983,7 +8167,7 @@
             <a:normAutofit fontScale="100000" lnSpcReduction="0"/>
           </a:bodyPr>
           <a:lstStyle>
-            <a:lvl1pPr marL="514095" indent="-514095" defTabSz="2243327">
+            <a:lvl1pPr marL="514094" indent="-514094" defTabSz="2243327">
               <a:spcBef>
                 <a:spcPts val="2200"/>
               </a:spcBef>
@@ -7992,7 +8176,12 @@
               </a:buClr>
               <a:buSzPct val="100000"/>
               <a:buChar char="•"/>
-              <a:defRPr sz="4416"/>
+              <a:defRPr sz="4400">
+                <a:latin typeface="Graphik"/>
+                <a:ea typeface="Graphik"/>
+                <a:cs typeface="Graphik"/>
+                <a:sym typeface="Graphik"/>
+              </a:defRPr>
             </a:lvl1pPr>
           </a:lstStyle>
           <a:p>
@@ -8022,7 +8211,7 @@
         <p:spPr>
           <a:xfrm>
             <a:off x="10801350" y="6351608"/>
-            <a:ext cx="2460299" cy="7038593"/>
+            <a:ext cx="2460300" cy="7038593"/>
           </a:xfrm>
           <a:prstGeom prst="rect">
             <a:avLst/>
@@ -8052,10 +8241,10 @@
         <a:srgbClr val="FFFFFF"/>
       </a:lt1>
       <a:dk2>
-        <a:srgbClr val="5E5E5E"/>
+        <a:srgbClr val="A7A7A7"/>
       </a:dk2>
       <a:lt2>
-        <a:srgbClr val="D5D5D5"/>
+        <a:srgbClr val="535353"/>
       </a:lt2>
       <a:accent1>
         <a:srgbClr val="0076BA"/>
@@ -8084,14 +8273,14 @@
     </a:clrScheme>
     <a:fontScheme name="31_ColorGradientLight">
       <a:majorFont>
-        <a:latin typeface="Graphik Semibold"/>
-        <a:ea typeface="Graphik Semibold"/>
-        <a:cs typeface="Graphik Semibold"/>
+        <a:latin typeface="Helvetica Neue"/>
+        <a:ea typeface="Helvetica Neue"/>
+        <a:cs typeface="Helvetica Neue"/>
       </a:majorFont>
       <a:minorFont>
-        <a:latin typeface="Graphik Semibold"/>
-        <a:ea typeface="Graphik Semibold"/>
-        <a:cs typeface="Graphik Semibold"/>
+        <a:latin typeface="Helvetica"/>
+        <a:ea typeface="Helvetica"/>
+        <a:cs typeface="Helvetica"/>
       </a:minorFont>
     </a:fontScheme>
     <a:fmtScheme name="31_ColorGradientLight">
@@ -8232,11 +8421,14 @@
     <a:spDef>
       <a:spPr>
         <a:solidFill>
-          <a:srgbClr val="000000"/>
+          <a:srgbClr val="FFFFFF"/>
         </a:solidFill>
-        <a:ln w="12700" cap="flat">
-          <a:noFill/>
-          <a:miter lim="400000"/>
+        <a:ln w="25400" cap="flat">
+          <a:solidFill>
+            <a:schemeClr val="accent1"/>
+          </a:solidFill>
+          <a:prstDash val="solid"/>
+          <a:round/>
         </a:ln>
         <a:effectLst/>
         <a:sp3d/>
@@ -8245,12 +8437,12 @@
         <a:spAutoFit/>
       </a:bodyPr>
       <a:lstStyle>
-        <a:defPPr marL="0" marR="0" indent="0" algn="ctr" defTabSz="457200" rtl="0" fontAlgn="auto" latinLnBrk="0" hangingPunct="0">
+        <a:defPPr marL="0" marR="0" indent="0" algn="l" defTabSz="2438400" rtl="0" fontAlgn="auto" latinLnBrk="0" hangingPunct="0">
           <a:lnSpc>
             <a:spcPct val="100000"/>
           </a:lnSpc>
           <a:spcBef>
-            <a:spcPts val="0"/>
+            <a:spcPts val="2400"/>
           </a:spcBef>
           <a:spcAft>
             <a:spcPts val="0"/>
@@ -8260,19 +8452,19 @@
           <a:buFontTx/>
           <a:buNone/>
           <a:tabLst/>
-          <a:defRPr b="0" baseline="0" cap="none" i="0" spc="0" strike="noStrike" sz="3200" u="none" kumimoji="0" normalizeH="0">
+          <a:defRPr b="0" baseline="0" cap="none" i="0" spc="0" strike="noStrike" sz="4800" u="none" kumimoji="0" normalizeH="0">
             <a:ln>
               <a:noFill/>
             </a:ln>
             <a:solidFill>
-              <a:srgbClr val="FFFFFF"/>
+              <a:srgbClr val="000000"/>
             </a:solidFill>
             <a:effectLst/>
             <a:uFillTx/>
-            <a:latin typeface="Graphik Medium"/>
-            <a:ea typeface="Graphik Medium"/>
-            <a:cs typeface="Graphik Medium"/>
-            <a:sym typeface="Graphik Medium"/>
+            <a:latin typeface="Graphik Semibold"/>
+            <a:ea typeface="Graphik Semibold"/>
+            <a:cs typeface="Graphik Semibold"/>
+            <a:sym typeface="Graphik Semibold"/>
           </a:defRPr>
         </a:defPPr>
         <a:lvl1pPr marL="0" marR="0" indent="0" algn="l" defTabSz="914400" rtl="0" fontAlgn="auto" latinLnBrk="1" hangingPunct="0">
@@ -8522,10 +8714,10 @@
         <a:noFill/>
         <a:ln w="25400" cap="flat">
           <a:solidFill>
-            <a:srgbClr val="000000"/>
+            <a:schemeClr val="accent1"/>
           </a:solidFill>
           <a:prstDash val="solid"/>
-          <a:miter lim="400000"/>
+          <a:round/>
         </a:ln>
         <a:effectLst/>
         <a:sp3d/>
@@ -8840,10 +9032,10 @@
             </a:solidFill>
             <a:effectLst/>
             <a:uFillTx/>
-            <a:latin typeface="Graphik"/>
-            <a:ea typeface="Graphik"/>
-            <a:cs typeface="Graphik"/>
-            <a:sym typeface="Graphik"/>
+            <a:latin typeface="Graphik Semibold"/>
+            <a:ea typeface="Graphik Semibold"/>
+            <a:cs typeface="Graphik Semibold"/>
+            <a:sym typeface="Graphik Semibold"/>
           </a:defRPr>
         </a:defPPr>
         <a:lvl1pPr marL="0" marR="0" indent="0" algn="l" defTabSz="914400" rtl="0" fontAlgn="auto" latinLnBrk="1" hangingPunct="0">
@@ -9103,10 +9295,10 @@
         <a:srgbClr val="FFFFFF"/>
       </a:lt1>
       <a:dk2>
-        <a:srgbClr val="5E5E5E"/>
+        <a:srgbClr val="A7A7A7"/>
       </a:dk2>
       <a:lt2>
-        <a:srgbClr val="D5D5D5"/>
+        <a:srgbClr val="535353"/>
       </a:lt2>
       <a:accent1>
         <a:srgbClr val="0076BA"/>
@@ -9135,14 +9327,14 @@
     </a:clrScheme>
     <a:fontScheme name="31_ColorGradientLight">
       <a:majorFont>
-        <a:latin typeface="Graphik Semibold"/>
-        <a:ea typeface="Graphik Semibold"/>
-        <a:cs typeface="Graphik Semibold"/>
+        <a:latin typeface="Helvetica Neue"/>
+        <a:ea typeface="Helvetica Neue"/>
+        <a:cs typeface="Helvetica Neue"/>
       </a:majorFont>
       <a:minorFont>
-        <a:latin typeface="Graphik Semibold"/>
-        <a:ea typeface="Graphik Semibold"/>
-        <a:cs typeface="Graphik Semibold"/>
+        <a:latin typeface="Helvetica"/>
+        <a:ea typeface="Helvetica"/>
+        <a:cs typeface="Helvetica"/>
       </a:minorFont>
     </a:fontScheme>
     <a:fmtScheme name="31_ColorGradientLight">
@@ -9283,11 +9475,14 @@
     <a:spDef>
       <a:spPr>
         <a:solidFill>
-          <a:srgbClr val="000000"/>
+          <a:srgbClr val="FFFFFF"/>
         </a:solidFill>
-        <a:ln w="12700" cap="flat">
-          <a:noFill/>
-          <a:miter lim="400000"/>
+        <a:ln w="25400" cap="flat">
+          <a:solidFill>
+            <a:schemeClr val="accent1"/>
+          </a:solidFill>
+          <a:prstDash val="solid"/>
+          <a:round/>
         </a:ln>
         <a:effectLst/>
         <a:sp3d/>
@@ -9296,12 +9491,12 @@
         <a:spAutoFit/>
       </a:bodyPr>
       <a:lstStyle>
-        <a:defPPr marL="0" marR="0" indent="0" algn="ctr" defTabSz="457200" rtl="0" fontAlgn="auto" latinLnBrk="0" hangingPunct="0">
+        <a:defPPr marL="0" marR="0" indent="0" algn="l" defTabSz="2438400" rtl="0" fontAlgn="auto" latinLnBrk="0" hangingPunct="0">
           <a:lnSpc>
             <a:spcPct val="100000"/>
           </a:lnSpc>
           <a:spcBef>
-            <a:spcPts val="0"/>
+            <a:spcPts val="2400"/>
           </a:spcBef>
           <a:spcAft>
             <a:spcPts val="0"/>
@@ -9311,19 +9506,19 @@
           <a:buFontTx/>
           <a:buNone/>
           <a:tabLst/>
-          <a:defRPr b="0" baseline="0" cap="none" i="0" spc="0" strike="noStrike" sz="3200" u="none" kumimoji="0" normalizeH="0">
+          <a:defRPr b="0" baseline="0" cap="none" i="0" spc="0" strike="noStrike" sz="4800" u="none" kumimoji="0" normalizeH="0">
             <a:ln>
               <a:noFill/>
             </a:ln>
             <a:solidFill>
-              <a:srgbClr val="FFFFFF"/>
+              <a:srgbClr val="000000"/>
             </a:solidFill>
             <a:effectLst/>
             <a:uFillTx/>
-            <a:latin typeface="Graphik Medium"/>
-            <a:ea typeface="Graphik Medium"/>
-            <a:cs typeface="Graphik Medium"/>
-            <a:sym typeface="Graphik Medium"/>
+            <a:latin typeface="Graphik Semibold"/>
+            <a:ea typeface="Graphik Semibold"/>
+            <a:cs typeface="Graphik Semibold"/>
+            <a:sym typeface="Graphik Semibold"/>
           </a:defRPr>
         </a:defPPr>
         <a:lvl1pPr marL="0" marR="0" indent="0" algn="l" defTabSz="914400" rtl="0" fontAlgn="auto" latinLnBrk="1" hangingPunct="0">
@@ -9573,10 +9768,10 @@
         <a:noFill/>
         <a:ln w="25400" cap="flat">
           <a:solidFill>
-            <a:srgbClr val="000000"/>
+            <a:schemeClr val="accent1"/>
           </a:solidFill>
           <a:prstDash val="solid"/>
-          <a:miter lim="400000"/>
+          <a:round/>
         </a:ln>
         <a:effectLst/>
         <a:sp3d/>
@@ -9891,10 +10086,10 @@
             </a:solidFill>
             <a:effectLst/>
             <a:uFillTx/>
-            <a:latin typeface="Graphik"/>
-            <a:ea typeface="Graphik"/>
-            <a:cs typeface="Graphik"/>
-            <a:sym typeface="Graphik"/>
+            <a:latin typeface="Graphik Semibold"/>
+            <a:ea typeface="Graphik Semibold"/>
+            <a:cs typeface="Graphik Semibold"/>
+            <a:sym typeface="Graphik Semibold"/>
           </a:defRPr>
         </a:defPPr>
         <a:lvl1pPr marL="0" marR="0" indent="0" algn="l" defTabSz="914400" rtl="0" fontAlgn="auto" latinLnBrk="1" hangingPunct="0">

</xml_diff>